<commit_message>
edit powerPoint and add group-member file
</commit_message>
<xml_diff>
--- a/Report.pptx
+++ b/Report.pptx
@@ -10528,7 +10528,10 @@
           <a:lstStyle/>
           <a:p>
             <a:r>
-              <a:rPr lang="en-US" dirty="0"/>
+              <a:rPr lang="en-US" dirty="0">
+                <a:latin typeface="Calibri" panose="020F0502020204030204" pitchFamily="34" charset="0"/>
+                <a:cs typeface="Calibri" panose="020F0502020204030204" pitchFamily="34" charset="0"/>
+              </a:rPr>
               <a:t>Sample Footer Text</a:t>
             </a:r>
           </a:p>
@@ -10561,11 +10564,17 @@
           <a:lstStyle/>
           <a:p>
             <a:fld id="{8B48EBF6-60E6-462A-9155-5FAF136BCCBC}" type="slidenum">
-              <a:rPr lang="en-US" smtClean="0"/>
+              <a:rPr lang="en-US" smtClean="0">
+                <a:latin typeface="Calibri" panose="020F0502020204030204" pitchFamily="34" charset="0"/>
+                <a:cs typeface="Calibri" panose="020F0502020204030204" pitchFamily="34" charset="0"/>
+              </a:rPr>
               <a:pPr/>
               <a:t>1</a:t>
             </a:fld>
-            <a:endParaRPr lang="en-US" dirty="0"/>
+            <a:endParaRPr lang="en-US" dirty="0">
+              <a:latin typeface="Calibri" panose="020F0502020204030204" pitchFamily="34" charset="0"/>
+              <a:cs typeface="Calibri" panose="020F0502020204030204" pitchFamily="34" charset="0"/>
+            </a:endParaRPr>
           </a:p>
         </p:txBody>
       </p:sp>
@@ -10763,22 +10772,22 @@
           <a:p>
             <a:pPr algn="ctr" rtl="1"/>
             <a:r>
-              <a:rPr lang="fa-IR" sz="7200" dirty="0">
-                <a:latin typeface="IRANSans" panose="020B0506030804020204" pitchFamily="34" charset="-78"/>
-                <a:cs typeface="IRANSans" panose="020B0506030804020204" pitchFamily="34" charset="-78"/>
+              <a:rPr lang="fa-IR" sz="7200" b="1" dirty="0">
+                <a:latin typeface="Calibri" panose="020F0502020204030204" pitchFamily="34" charset="0"/>
+                <a:cs typeface="Calibri" panose="020F0502020204030204" pitchFamily="34" charset="0"/>
               </a:rPr>
               <a:t>به نام خدا</a:t>
             </a:r>
-            <a:endParaRPr lang="en-US" sz="7200" dirty="0">
-              <a:latin typeface="IRANSans" panose="020B0506030804020204" pitchFamily="34" charset="-78"/>
-              <a:cs typeface="IRANSans" panose="020B0506030804020204" pitchFamily="34" charset="-78"/>
+            <a:endParaRPr lang="en-US" sz="7200" b="1" dirty="0">
+              <a:latin typeface="Calibri" panose="020F0502020204030204" pitchFamily="34" charset="0"/>
+              <a:cs typeface="Calibri" panose="020F0502020204030204" pitchFamily="34" charset="0"/>
             </a:endParaRPr>
           </a:p>
           <a:p>
             <a:pPr algn="ctr" rtl="1"/>
             <a:endParaRPr lang="fa-IR" sz="7200" dirty="0">
-              <a:latin typeface="IRANSans" panose="020B0506030804020204" pitchFamily="34" charset="-78"/>
-              <a:cs typeface="IRANSans" panose="020B0506030804020204" pitchFamily="34" charset="-78"/>
+              <a:latin typeface="Calibri" panose="020F0502020204030204" pitchFamily="34" charset="0"/>
+              <a:cs typeface="Calibri" panose="020F0502020204030204" pitchFamily="34" charset="0"/>
             </a:endParaRPr>
           </a:p>
         </p:txBody>
@@ -10813,15 +10822,15 @@
           <a:p>
             <a:pPr algn="ctr" rtl="1"/>
             <a:r>
-              <a:rPr lang="fa-IR" sz="4000" dirty="0">
-                <a:latin typeface="IRANSans" panose="020B0506030804020204" pitchFamily="34" charset="-78"/>
-                <a:cs typeface="IRANSans" panose="020B0506030804020204" pitchFamily="34" charset="-78"/>
+              <a:rPr lang="fa-IR" sz="4000" b="1" dirty="0">
+                <a:latin typeface="Calibri" panose="020F0502020204030204" pitchFamily="34" charset="0"/>
+                <a:cs typeface="Calibri" panose="020F0502020204030204" pitchFamily="34" charset="0"/>
               </a:rPr>
               <a:t>پیاده سازی صف با لیست پیوندی</a:t>
             </a:r>
-            <a:endParaRPr lang="en-US" sz="4000" dirty="0">
-              <a:latin typeface="IRANSans" panose="020B0506030804020204" pitchFamily="34" charset="-78"/>
-              <a:cs typeface="IRANSans" panose="020B0506030804020204" pitchFamily="34" charset="-78"/>
+            <a:endParaRPr lang="en-US" sz="4000" b="1" dirty="0">
+              <a:latin typeface="Calibri" panose="020F0502020204030204" pitchFamily="34" charset="0"/>
+              <a:cs typeface="Calibri" panose="020F0502020204030204" pitchFamily="34" charset="0"/>
             </a:endParaRPr>
           </a:p>
         </p:txBody>
@@ -10884,7 +10893,10 @@
           <a:lstStyle/>
           <a:p>
             <a:r>
-              <a:rPr lang="en-US" dirty="0"/>
+              <a:rPr lang="en-US" dirty="0">
+                <a:latin typeface="Calibri" panose="020F0502020204030204" pitchFamily="34" charset="0"/>
+                <a:cs typeface="Calibri" panose="020F0502020204030204" pitchFamily="34" charset="0"/>
+              </a:rPr>
               <a:t>Sample Footer Text</a:t>
             </a:r>
           </a:p>
@@ -10930,46 +10942,46 @@
               </a:spcAft>
             </a:pPr>
             <a:r>
-              <a:rPr lang="fa-IR" sz="1800" dirty="0">
+              <a:rPr lang="fa-IR" sz="2000" dirty="0">
                 <a:effectLst/>
-                <a:latin typeface="IRANSans" panose="020B0506030804020204" pitchFamily="34" charset="-78"/>
+                <a:latin typeface="Calibri" panose="020F0502020204030204" pitchFamily="34" charset="0"/>
                 <a:ea typeface="Calibri" panose="020F0502020204030204" pitchFamily="34" charset="0"/>
-                <a:cs typeface="IRANSans" panose="020B0506030804020204" pitchFamily="34" charset="-78"/>
+                <a:cs typeface="Calibri" panose="020F0502020204030204" pitchFamily="34" charset="0"/>
               </a:rPr>
               <a:t>تابع ()</a:t>
             </a:r>
             <a:r>
-              <a:rPr lang="en-US" sz="1800" dirty="0" err="1">
+              <a:rPr lang="en-US" sz="2000" dirty="0" err="1">
                 <a:effectLst/>
-                <a:latin typeface="IRANSans" panose="020B0506030804020204" pitchFamily="34" charset="-78"/>
+                <a:latin typeface="Calibri" panose="020F0502020204030204" pitchFamily="34" charset="0"/>
                 <a:ea typeface="Calibri" panose="020F0502020204030204" pitchFamily="34" charset="0"/>
-                <a:cs typeface="IRANSans" panose="020B0506030804020204" pitchFamily="34" charset="-78"/>
+                <a:cs typeface="Calibri" panose="020F0502020204030204" pitchFamily="34" charset="0"/>
               </a:rPr>
               <a:t>deQueue</a:t>
             </a:r>
             <a:r>
-              <a:rPr lang="en-US" sz="1800" dirty="0">
+              <a:rPr lang="en-US" sz="2000" dirty="0">
                 <a:effectLst/>
-                <a:latin typeface="IRANSans" panose="020B0506030804020204" pitchFamily="34" charset="-78"/>
+                <a:latin typeface="Calibri" panose="020F0502020204030204" pitchFamily="34" charset="0"/>
                 <a:ea typeface="Calibri" panose="020F0502020204030204" pitchFamily="34" charset="0"/>
-                <a:cs typeface="IRANSans" panose="020B0506030804020204" pitchFamily="34" charset="-78"/>
+                <a:cs typeface="Calibri" panose="020F0502020204030204" pitchFamily="34" charset="0"/>
               </a:rPr>
               <a:t> </a:t>
             </a:r>
             <a:r>
-              <a:rPr lang="fa-IR" sz="1800" dirty="0">
+              <a:rPr lang="fa-IR" sz="2000" dirty="0">
                 <a:effectLst/>
-                <a:latin typeface="IRANSans" panose="020B0506030804020204" pitchFamily="34" charset="-78"/>
+                <a:latin typeface="Calibri" panose="020F0502020204030204" pitchFamily="34" charset="0"/>
                 <a:ea typeface="Calibri" panose="020F0502020204030204" pitchFamily="34" charset="0"/>
-                <a:cs typeface="IRANSans" panose="020B0506030804020204" pitchFamily="34" charset="-78"/>
-              </a:rPr>
-              <a:t> را برای حذف عنصری با بالاترین الویت در صف پیاده سازی شده است.</a:t>
-            </a:r>
-            <a:endParaRPr lang="en-US" sz="1800" dirty="0">
+                <a:cs typeface="Calibri" panose="020F0502020204030204" pitchFamily="34" charset="0"/>
+              </a:rPr>
+              <a:t> را برای حذف عنصری با بالاترین اولویت در صف پیاده سازی شده است.</a:t>
+            </a:r>
+            <a:endParaRPr lang="en-US" sz="2000" dirty="0">
               <a:effectLst/>
-              <a:latin typeface="IRANSans" panose="020B0506030804020204" pitchFamily="34" charset="-78"/>
+              <a:latin typeface="Calibri" panose="020F0502020204030204" pitchFamily="34" charset="0"/>
               <a:ea typeface="Calibri" panose="020F0502020204030204" pitchFamily="34" charset="0"/>
-              <a:cs typeface="IRANSans" panose="020B0506030804020204" pitchFamily="34" charset="-78"/>
+              <a:cs typeface="Calibri" panose="020F0502020204030204" pitchFamily="34" charset="0"/>
             </a:endParaRPr>
           </a:p>
           <a:p>
@@ -10986,9 +10998,9 @@
             </a:pPr>
             <a:endParaRPr lang="en-US" sz="1500" dirty="0">
               <a:effectLst/>
-              <a:latin typeface="IRANSans" panose="020B0506030804020204" pitchFamily="34" charset="-78"/>
+              <a:latin typeface="Calibri" panose="020F0502020204030204" pitchFamily="34" charset="0"/>
               <a:ea typeface="Calibri" panose="020F0502020204030204" pitchFamily="34" charset="0"/>
-              <a:cs typeface="IRANSans" panose="020B0506030804020204" pitchFamily="34" charset="-78"/>
+              <a:cs typeface="Calibri" panose="020F0502020204030204" pitchFamily="34" charset="0"/>
             </a:endParaRPr>
           </a:p>
           <a:p>
@@ -10998,8 +11010,8 @@
                 <a:srgbClr val="202122"/>
               </a:solidFill>
               <a:effectLst/>
-              <a:latin typeface="IRANSans" panose="020B0506030804020204" pitchFamily="34" charset="-78"/>
-              <a:cs typeface="IRANSans" panose="020B0506030804020204" pitchFamily="34" charset="-78"/>
+              <a:latin typeface="Calibri" panose="020F0502020204030204" pitchFamily="34" charset="0"/>
+              <a:cs typeface="Calibri" panose="020F0502020204030204" pitchFamily="34" charset="0"/>
             </a:endParaRPr>
           </a:p>
         </p:txBody>
@@ -11031,11 +11043,17 @@
           <a:lstStyle/>
           <a:p>
             <a:fld id="{8B48EBF6-60E6-462A-9155-5FAF136BCCBC}" type="slidenum">
-              <a:rPr lang="en-US" smtClean="0"/>
+              <a:rPr lang="en-US" smtClean="0">
+                <a:latin typeface="Calibri" panose="020F0502020204030204" pitchFamily="34" charset="0"/>
+                <a:cs typeface="Calibri" panose="020F0502020204030204" pitchFamily="34" charset="0"/>
+              </a:rPr>
               <a:pPr/>
               <a:t>10</a:t>
             </a:fld>
-            <a:endParaRPr lang="en-US" dirty="0"/>
+            <a:endParaRPr lang="en-US" dirty="0">
+              <a:latin typeface="Calibri" panose="020F0502020204030204" pitchFamily="34" charset="0"/>
+              <a:cs typeface="Calibri" panose="020F0502020204030204" pitchFamily="34" charset="0"/>
+            </a:endParaRPr>
           </a:p>
         </p:txBody>
       </p:sp>
@@ -11069,13 +11087,13 @@
           <a:p>
             <a:pPr algn="ctr" rtl="1"/>
             <a:r>
-              <a:rPr lang="fa-IR" sz="2800" b="0" i="0" dirty="0">
+              <a:rPr lang="fa-IR" sz="2800" b="1" i="0" dirty="0">
                 <a:solidFill>
                   <a:srgbClr val="EB5A64"/>
                 </a:solidFill>
                 <a:effectLst/>
-                <a:latin typeface="IRANSans" panose="020B0506030804020204" pitchFamily="34" charset="-78"/>
-                <a:cs typeface="IRANSans" panose="020B0506030804020204" pitchFamily="34" charset="-78"/>
+                <a:latin typeface="Calibri" panose="020F0502020204030204" pitchFamily="34" charset="0"/>
+                <a:cs typeface="Calibri" panose="020F0502020204030204" pitchFamily="34" charset="0"/>
               </a:rPr>
               <a:t>الگوریتم حذف کردن صف الویت دار:</a:t>
             </a:r>
@@ -11140,7 +11158,10 @@
           <a:lstStyle/>
           <a:p>
             <a:r>
-              <a:rPr lang="en-US" dirty="0"/>
+              <a:rPr lang="en-US" dirty="0">
+                <a:latin typeface="Calibri" panose="020F0502020204030204" pitchFamily="34" charset="0"/>
+                <a:cs typeface="Calibri" panose="020F0502020204030204" pitchFamily="34" charset="0"/>
+              </a:rPr>
               <a:t>Sample Footer Text</a:t>
             </a:r>
           </a:p>
@@ -11186,19 +11207,25 @@
               </a:spcAft>
             </a:pPr>
             <a:r>
-              <a:rPr lang="fa-IR" sz="1800" b="1" dirty="0">
+              <a:rPr lang="fa-IR" sz="2000" b="1" dirty="0">
+                <a:solidFill>
+                  <a:srgbClr val="7030A0"/>
+                </a:solidFill>
                 <a:effectLst/>
                 <a:latin typeface="Calibri" panose="020F0502020204030204" pitchFamily="34" charset="0"/>
                 <a:ea typeface="Calibri" panose="020F0502020204030204" pitchFamily="34" charset="0"/>
-                <a:cs typeface="IRANSans" panose="020B0506030804020204" pitchFamily="34" charset="-78"/>
+                <a:cs typeface="Calibri" panose="020F0502020204030204" pitchFamily="34" charset="0"/>
               </a:rPr>
               <a:t>صف خطی و صف الویت دار:</a:t>
             </a:r>
-            <a:endParaRPr lang="en-US" sz="1800" dirty="0">
+            <a:endParaRPr lang="en-US" sz="2000" dirty="0">
+              <a:solidFill>
+                <a:srgbClr val="7030A0"/>
+              </a:solidFill>
               <a:effectLst/>
               <a:latin typeface="Calibri" panose="020F0502020204030204" pitchFamily="34" charset="0"/>
               <a:ea typeface="Calibri" panose="020F0502020204030204" pitchFamily="34" charset="0"/>
-              <a:cs typeface="Arial" panose="020B0604020202020204" pitchFamily="34" charset="0"/>
+              <a:cs typeface="Calibri" panose="020F0502020204030204" pitchFamily="34" charset="0"/>
             </a:endParaRPr>
           </a:p>
           <a:p>
@@ -11214,46 +11241,68 @@
               </a:spcAft>
             </a:pPr>
             <a:r>
-              <a:rPr lang="fa-IR" sz="1800" dirty="0">
+              <a:rPr lang="fa-IR" sz="2000" dirty="0">
                 <a:effectLst/>
                 <a:latin typeface="Calibri" panose="020F0502020204030204" pitchFamily="34" charset="0"/>
                 <a:ea typeface="Calibri" panose="020F0502020204030204" pitchFamily="34" charset="0"/>
-                <a:cs typeface="IRANSans" panose="020B0506030804020204" pitchFamily="34" charset="-78"/>
-              </a:rPr>
-              <a:t>برای جستجوی یک مقدار در هر دو صف خطی و الویت دار، تابع </a:t>
-            </a:r>
-            <a:r>
-              <a:rPr lang="en-US" sz="1800" dirty="0" err="1">
+                <a:cs typeface="Calibri" panose="020F0502020204030204" pitchFamily="34" charset="0"/>
+              </a:rPr>
+              <a:t>برای جستجوی یک مقدار در هر دو صف خطی و اولویت دار، تابع </a:t>
+            </a:r>
+            <a:r>
+              <a:rPr lang="en-US" sz="2000" dirty="0" err="1">
                 <a:effectLst/>
-                <a:latin typeface="IRANSans" panose="020B0506030804020204" pitchFamily="34" charset="-78"/>
+                <a:latin typeface="Calibri" panose="020F0502020204030204" pitchFamily="34" charset="0"/>
                 <a:ea typeface="Calibri" panose="020F0502020204030204" pitchFamily="34" charset="0"/>
-                <a:cs typeface="Arial" panose="020B0604020202020204" pitchFamily="34" charset="0"/>
+                <a:cs typeface="Calibri" panose="020F0502020204030204" pitchFamily="34" charset="0"/>
               </a:rPr>
               <a:t>search_in_queue</a:t>
             </a:r>
             <a:r>
-              <a:rPr lang="en-US" sz="1800" dirty="0">
+              <a:rPr lang="en-US" sz="2000" dirty="0">
                 <a:effectLst/>
-                <a:latin typeface="IRANSans" panose="020B0506030804020204" pitchFamily="34" charset="-78"/>
+                <a:latin typeface="Calibri" panose="020F0502020204030204" pitchFamily="34" charset="0"/>
                 <a:ea typeface="Calibri" panose="020F0502020204030204" pitchFamily="34" charset="0"/>
-                <a:cs typeface="Arial" panose="020B0604020202020204" pitchFamily="34" charset="0"/>
+                <a:cs typeface="Calibri" panose="020F0502020204030204" pitchFamily="34" charset="0"/>
               </a:rPr>
               <a:t>()</a:t>
             </a:r>
             <a:r>
-              <a:rPr lang="fa-IR" sz="1800" dirty="0">
+              <a:rPr lang="fa-IR" sz="2000" dirty="0">
                 <a:effectLst/>
                 <a:latin typeface="Calibri" panose="020F0502020204030204" pitchFamily="34" charset="0"/>
                 <a:ea typeface="Calibri" panose="020F0502020204030204" pitchFamily="34" charset="0"/>
-                <a:cs typeface="IRANSans" panose="020B0506030804020204" pitchFamily="34" charset="-78"/>
-              </a:rPr>
-              <a:t> پیاده سازی شده است. این تابع یک آرگومان ورودی دارد که آن هم مقدار مقداری که باید در صف جستجو شود. اگر این مقدار در صف وجود داشت، ایندکس آن توسط تابع بازگردانده می شود.</a:t>
-            </a:r>
-            <a:endParaRPr lang="en-US" sz="1800" dirty="0">
+                <a:cs typeface="Calibri" panose="020F0502020204030204" pitchFamily="34" charset="0"/>
+              </a:rPr>
+              <a:t> پیاده سازی شده است.</a:t>
+            </a:r>
+          </a:p>
+          <a:p>
+            <a:pPr marL="0" marR="0" algn="r" rtl="1">
+              <a:lnSpc>
+                <a:spcPct val="107000"/>
+              </a:lnSpc>
+              <a:spcBef>
+                <a:spcPts val="0"/>
+              </a:spcBef>
+              <a:spcAft>
+                <a:spcPts val="800"/>
+              </a:spcAft>
+            </a:pPr>
+            <a:r>
+              <a:rPr lang="fa-IR" sz="2000" dirty="0">
+                <a:effectLst/>
+                <a:latin typeface="Calibri" panose="020F0502020204030204" pitchFamily="34" charset="0"/>
+                <a:ea typeface="Calibri" panose="020F0502020204030204" pitchFamily="34" charset="0"/>
+                <a:cs typeface="Calibri" panose="020F0502020204030204" pitchFamily="34" charset="0"/>
+              </a:rPr>
+              <a:t>این تابع یک آرگومان ورودی دارد که آن هم مقدار مقداری که باید در صف جستجو شود. اگر این مقدار در صف وجود داشت، ایندکس آن توسط تابع بازگردانده می شود.</a:t>
+            </a:r>
+            <a:endParaRPr lang="en-US" sz="2000" dirty="0">
               <a:effectLst/>
               <a:latin typeface="Calibri" panose="020F0502020204030204" pitchFamily="34" charset="0"/>
               <a:ea typeface="Calibri" panose="020F0502020204030204" pitchFamily="34" charset="0"/>
-              <a:cs typeface="Arial" panose="020B0604020202020204" pitchFamily="34" charset="0"/>
+              <a:cs typeface="Calibri" panose="020F0502020204030204" pitchFamily="34" charset="0"/>
             </a:endParaRPr>
           </a:p>
           <a:p>
@@ -11268,22 +11317,22 @@
                 <a:spcPts val="800"/>
               </a:spcAft>
             </a:pPr>
-            <a:endParaRPr lang="en-US" sz="1500" dirty="0">
+            <a:endParaRPr lang="en-US" sz="2000" dirty="0">
               <a:effectLst/>
               <a:latin typeface="Calibri" panose="020F0502020204030204" pitchFamily="34" charset="0"/>
               <a:ea typeface="Calibri" panose="020F0502020204030204" pitchFamily="34" charset="0"/>
-              <a:cs typeface="Arial" panose="020B0604020202020204" pitchFamily="34" charset="0"/>
+              <a:cs typeface="Calibri" panose="020F0502020204030204" pitchFamily="34" charset="0"/>
             </a:endParaRPr>
           </a:p>
           <a:p>
             <a:pPr algn="r" rtl="1"/>
-            <a:endParaRPr lang="fa-IR" sz="1500" b="0" i="0" dirty="0">
+            <a:endParaRPr lang="fa-IR" sz="2000" b="0" i="0" dirty="0">
               <a:solidFill>
                 <a:srgbClr val="202122"/>
               </a:solidFill>
               <a:effectLst/>
-              <a:latin typeface="IRANSans" panose="020B0506030804020204" pitchFamily="34" charset="-78"/>
-              <a:cs typeface="IRANSans" panose="020B0506030804020204" pitchFamily="34" charset="-78"/>
+              <a:latin typeface="Calibri" panose="020F0502020204030204" pitchFamily="34" charset="0"/>
+              <a:cs typeface="Calibri" panose="020F0502020204030204" pitchFamily="34" charset="0"/>
             </a:endParaRPr>
           </a:p>
         </p:txBody>
@@ -11315,11 +11364,17 @@
           <a:lstStyle/>
           <a:p>
             <a:fld id="{8B48EBF6-60E6-462A-9155-5FAF136BCCBC}" type="slidenum">
-              <a:rPr lang="en-US" smtClean="0"/>
+              <a:rPr lang="en-US" smtClean="0">
+                <a:latin typeface="Calibri" panose="020F0502020204030204" pitchFamily="34" charset="0"/>
+                <a:cs typeface="Calibri" panose="020F0502020204030204" pitchFamily="34" charset="0"/>
+              </a:rPr>
               <a:pPr/>
               <a:t>11</a:t>
             </a:fld>
-            <a:endParaRPr lang="en-US" dirty="0"/>
+            <a:endParaRPr lang="en-US" dirty="0">
+              <a:latin typeface="Calibri" panose="020F0502020204030204" pitchFamily="34" charset="0"/>
+              <a:cs typeface="Calibri" panose="020F0502020204030204" pitchFamily="34" charset="0"/>
+            </a:endParaRPr>
           </a:p>
         </p:txBody>
       </p:sp>
@@ -11353,34 +11408,34 @@
           <a:p>
             <a:pPr algn="ctr" rtl="1"/>
             <a:r>
-              <a:rPr lang="fa-IR" sz="2800" b="0" i="0" dirty="0">
+              <a:rPr lang="fa-IR" sz="2800" b="1" i="0" dirty="0">
                 <a:solidFill>
                   <a:srgbClr val="EB5A64"/>
                 </a:solidFill>
                 <a:effectLst/>
-                <a:latin typeface="IRANSans" panose="020B0506030804020204" pitchFamily="34" charset="-78"/>
-                <a:cs typeface="IRANSans" panose="020B0506030804020204" pitchFamily="34" charset="-78"/>
+                <a:latin typeface="Calibri" panose="020F0502020204030204" pitchFamily="34" charset="0"/>
+                <a:cs typeface="Calibri" panose="020F0502020204030204" pitchFamily="34" charset="0"/>
               </a:rPr>
               <a:t>الگوریتم </a:t>
             </a:r>
             <a:r>
-              <a:rPr lang="fa-IR" sz="2800" dirty="0">
+              <a:rPr lang="fa-IR" sz="2800" b="1" dirty="0">
                 <a:solidFill>
                   <a:srgbClr val="EB5A64"/>
                 </a:solidFill>
-                <a:latin typeface="IRANSans" panose="020B0506030804020204" pitchFamily="34" charset="-78"/>
-                <a:cs typeface="IRANSans" panose="020B0506030804020204" pitchFamily="34" charset="-78"/>
+                <a:latin typeface="Calibri" panose="020F0502020204030204" pitchFamily="34" charset="0"/>
+                <a:cs typeface="Calibri" panose="020F0502020204030204" pitchFamily="34" charset="0"/>
               </a:rPr>
               <a:t>جستجوی یک مقدار</a:t>
             </a:r>
             <a:r>
-              <a:rPr lang="fa-IR" sz="2800" b="0" i="0" dirty="0">
+              <a:rPr lang="fa-IR" sz="2800" b="1" i="0" dirty="0">
                 <a:solidFill>
                   <a:srgbClr val="EB5A64"/>
                 </a:solidFill>
                 <a:effectLst/>
-                <a:latin typeface="IRANSans" panose="020B0506030804020204" pitchFamily="34" charset="-78"/>
-                <a:cs typeface="IRANSans" panose="020B0506030804020204" pitchFamily="34" charset="-78"/>
+                <a:latin typeface="Calibri" panose="020F0502020204030204" pitchFamily="34" charset="0"/>
+                <a:cs typeface="Calibri" panose="020F0502020204030204" pitchFamily="34" charset="0"/>
               </a:rPr>
               <a:t>:</a:t>
             </a:r>
@@ -11445,7 +11500,10 @@
           <a:lstStyle/>
           <a:p>
             <a:r>
-              <a:rPr lang="en-US" dirty="0"/>
+              <a:rPr lang="en-US" dirty="0">
+                <a:latin typeface="Calibri" panose="020F0502020204030204" pitchFamily="34" charset="0"/>
+                <a:cs typeface="Calibri" panose="020F0502020204030204" pitchFamily="34" charset="0"/>
+              </a:rPr>
               <a:t>Sample Footer Text</a:t>
             </a:r>
           </a:p>
@@ -11491,136 +11549,101 @@
               </a:spcAft>
             </a:pPr>
             <a:r>
-              <a:rPr lang="fa-IR" sz="1800" dirty="0">
+              <a:rPr lang="fa-IR" sz="2000" dirty="0">
                 <a:effectLst/>
                 <a:latin typeface="Calibri" panose="020F0502020204030204" pitchFamily="34" charset="0"/>
                 <a:ea typeface="Calibri" panose="020F0502020204030204" pitchFamily="34" charset="0"/>
-                <a:cs typeface="IRANSans" panose="020B0506030804020204" pitchFamily="34" charset="-78"/>
-              </a:rPr>
-              <a:t>برای ادغام دو صف از </a:t>
-            </a:r>
-            <a:r>
-              <a:rPr lang="fa-IR" sz="1800" dirty="0" err="1">
+                <a:cs typeface="Calibri" panose="020F0502020204030204" pitchFamily="34" charset="0"/>
+              </a:rPr>
+              <a:t>برای ادغام دو صف از دو تاب</a:t>
+            </a:r>
+            <a:r>
+              <a:rPr lang="fa-IR" sz="2000" dirty="0">
+                <a:latin typeface="Calibri" panose="020F0502020204030204" pitchFamily="34" charset="0"/>
+                <a:ea typeface="Calibri" panose="020F0502020204030204" pitchFamily="34" charset="0"/>
+                <a:cs typeface="Calibri" panose="020F0502020204030204" pitchFamily="34" charset="0"/>
+              </a:rPr>
+              <a:t>ع </a:t>
+            </a:r>
+            <a:r>
+              <a:rPr lang="fa-IR" sz="2000" dirty="0">
                 <a:effectLst/>
                 <a:latin typeface="Calibri" panose="020F0502020204030204" pitchFamily="34" charset="0"/>
                 <a:ea typeface="Calibri" panose="020F0502020204030204" pitchFamily="34" charset="0"/>
-                <a:cs typeface="IRANSans" panose="020B0506030804020204" pitchFamily="34" charset="-78"/>
-              </a:rPr>
-              <a:t>دوتاب</a:t>
-            </a:r>
-            <a:r>
-              <a:rPr lang="fa-IR" dirty="0" err="1">
+                <a:cs typeface="Calibri" panose="020F0502020204030204" pitchFamily="34" charset="0"/>
+              </a:rPr>
+              <a:t> ()</a:t>
+            </a:r>
+            <a:r>
+              <a:rPr lang="en-US" sz="2000" dirty="0" err="1">
+                <a:effectLst/>
                 <a:latin typeface="Calibri" panose="020F0502020204030204" pitchFamily="34" charset="0"/>
                 <a:ea typeface="Calibri" panose="020F0502020204030204" pitchFamily="34" charset="0"/>
-                <a:cs typeface="IRANSans" panose="020B0506030804020204" pitchFamily="34" charset="-78"/>
-              </a:rPr>
-              <a:t>ع</a:t>
-            </a:r>
-            <a:r>
-              <a:rPr lang="fa-IR" dirty="0">
+                <a:cs typeface="Calibri" panose="020F0502020204030204" pitchFamily="34" charset="0"/>
+              </a:rPr>
+              <a:t>merge_two_priority_queue</a:t>
+            </a:r>
+            <a:r>
+              <a:rPr lang="fa-IR" sz="2000" dirty="0">
+                <a:effectLst/>
                 <a:latin typeface="Calibri" panose="020F0502020204030204" pitchFamily="34" charset="0"/>
                 <a:ea typeface="Calibri" panose="020F0502020204030204" pitchFamily="34" charset="0"/>
-                <a:cs typeface="IRANSans" panose="020B0506030804020204" pitchFamily="34" charset="-78"/>
-              </a:rPr>
-              <a:t> </a:t>
-            </a:r>
-            <a:r>
-              <a:rPr lang="fa-IR" sz="1800" dirty="0">
+                <a:cs typeface="Calibri" panose="020F0502020204030204" pitchFamily="34" charset="0"/>
+              </a:rPr>
+              <a:t>  و ()</a:t>
+            </a:r>
+            <a:r>
+              <a:rPr lang="en-US" sz="2000" dirty="0" err="1">
                 <a:effectLst/>
                 <a:latin typeface="Calibri" panose="020F0502020204030204" pitchFamily="34" charset="0"/>
                 <a:ea typeface="Calibri" panose="020F0502020204030204" pitchFamily="34" charset="0"/>
-                <a:cs typeface="IRANSans" panose="020B0506030804020204" pitchFamily="34" charset="-78"/>
-              </a:rPr>
-              <a:t> ()</a:t>
-            </a:r>
-            <a:r>
-              <a:rPr lang="en-US" sz="1800" dirty="0" err="1">
+                <a:cs typeface="Calibri" panose="020F0502020204030204" pitchFamily="34" charset="0"/>
+              </a:rPr>
+              <a:t>merge_two_queue</a:t>
+            </a:r>
+            <a:r>
+              <a:rPr lang="fa-IR" sz="2000" dirty="0">
                 <a:effectLst/>
-                <a:latin typeface="IRANSans" panose="020B0506030804020204" pitchFamily="34" charset="-78"/>
+                <a:latin typeface="Calibri" panose="020F0502020204030204" pitchFamily="34" charset="0"/>
                 <a:ea typeface="Calibri" panose="020F0502020204030204" pitchFamily="34" charset="0"/>
-                <a:cs typeface="Arial" panose="020B0604020202020204" pitchFamily="34" charset="0"/>
-              </a:rPr>
-              <a:t>merg_tow_priority_queue</a:t>
-            </a:r>
-            <a:r>
-              <a:rPr lang="fa-IR" sz="1800" dirty="0">
+                <a:cs typeface="Calibri" panose="020F0502020204030204" pitchFamily="34" charset="0"/>
+              </a:rPr>
+              <a:t> استفاده می شود که یک صف را به صورت </a:t>
+            </a:r>
+            <a:r>
+              <a:rPr lang="fa-IR" sz="2000" dirty="0" err="1">
                 <a:effectLst/>
                 <a:latin typeface="Calibri" panose="020F0502020204030204" pitchFamily="34" charset="0"/>
                 <a:ea typeface="Calibri" panose="020F0502020204030204" pitchFamily="34" charset="0"/>
-                <a:cs typeface="IRANSans" panose="020B0506030804020204" pitchFamily="34" charset="-78"/>
-              </a:rPr>
-              <a:t>  و ()</a:t>
-            </a:r>
-            <a:r>
-              <a:rPr lang="en-US" sz="1800" dirty="0" err="1">
+                <a:cs typeface="Calibri" panose="020F0502020204030204" pitchFamily="34" charset="0"/>
+              </a:rPr>
+              <a:t>آرگومان</a:t>
+            </a:r>
+            <a:r>
+              <a:rPr lang="fa-IR" sz="2000" dirty="0">
                 <a:effectLst/>
-                <a:latin typeface="IRANSans" panose="020B0506030804020204" pitchFamily="34" charset="-78"/>
+                <a:latin typeface="Calibri" panose="020F0502020204030204" pitchFamily="34" charset="0"/>
                 <a:ea typeface="Calibri" panose="020F0502020204030204" pitchFamily="34" charset="0"/>
-                <a:cs typeface="Arial" panose="020B0604020202020204" pitchFamily="34" charset="0"/>
-              </a:rPr>
-              <a:t>merg_tow_queue</a:t>
-            </a:r>
-            <a:r>
-              <a:rPr lang="fa-IR" sz="1800" dirty="0">
+                <a:cs typeface="Calibri" panose="020F0502020204030204" pitchFamily="34" charset="0"/>
+              </a:rPr>
+              <a:t> ورودی دریافت می کند و به صف دیگر با استفاده از </a:t>
+            </a:r>
+            <a:r>
+              <a:rPr lang="en-US" sz="2000" dirty="0">
                 <a:effectLst/>
-                <a:latin typeface="IRANSans" panose="020B0506030804020204" pitchFamily="34" charset="-78"/>
+                <a:latin typeface="Calibri" panose="020F0502020204030204" pitchFamily="34" charset="0"/>
                 <a:ea typeface="Calibri" panose="020F0502020204030204" pitchFamily="34" charset="0"/>
-                <a:cs typeface="Arial" panose="020B0604020202020204" pitchFamily="34" charset="0"/>
-              </a:rPr>
-              <a:t> استفاده میشود که یک صف را </a:t>
-            </a:r>
-            <a:r>
-              <a:rPr lang="fa-IR" sz="1800" dirty="0" err="1">
-                <a:effectLst/>
-                <a:latin typeface="IRANSans" panose="020B0506030804020204" pitchFamily="34" charset="-78"/>
+                <a:cs typeface="Calibri" panose="020F0502020204030204" pitchFamily="34" charset="0"/>
+              </a:rPr>
+              <a:t>pointer this</a:t>
+            </a:r>
+            <a:r>
+              <a:rPr lang="fa-IR" sz="2000" dirty="0">
+                <a:latin typeface="Calibri" panose="020F0502020204030204" pitchFamily="34" charset="0"/>
                 <a:ea typeface="Calibri" panose="020F0502020204030204" pitchFamily="34" charset="0"/>
-                <a:cs typeface="Arial" panose="020B0604020202020204" pitchFamily="34" charset="0"/>
-              </a:rPr>
-              <a:t>بصورت</a:t>
-            </a:r>
-            <a:r>
-              <a:rPr lang="fa-IR" sz="1800" dirty="0">
-                <a:effectLst/>
-                <a:latin typeface="IRANSans" panose="020B0506030804020204" pitchFamily="34" charset="-78"/>
-                <a:ea typeface="Calibri" panose="020F0502020204030204" pitchFamily="34" charset="0"/>
-                <a:cs typeface="Arial" panose="020B0604020202020204" pitchFamily="34" charset="0"/>
-              </a:rPr>
-              <a:t> </a:t>
-            </a:r>
-            <a:r>
-              <a:rPr lang="fa-IR" sz="1800" dirty="0" err="1">
-                <a:effectLst/>
-                <a:latin typeface="IRANSans" panose="020B0506030804020204" pitchFamily="34" charset="-78"/>
-                <a:ea typeface="Calibri" panose="020F0502020204030204" pitchFamily="34" charset="0"/>
-                <a:cs typeface="Arial" panose="020B0604020202020204" pitchFamily="34" charset="0"/>
-              </a:rPr>
-              <a:t>ارگومان</a:t>
-            </a:r>
-            <a:r>
-              <a:rPr lang="fa-IR" sz="1800" dirty="0">
-                <a:effectLst/>
-                <a:latin typeface="IRANSans" panose="020B0506030804020204" pitchFamily="34" charset="-78"/>
-                <a:ea typeface="Calibri" panose="020F0502020204030204" pitchFamily="34" charset="0"/>
-                <a:cs typeface="Arial" panose="020B0604020202020204" pitchFamily="34" charset="0"/>
-              </a:rPr>
-              <a:t> ورودی دریافت میکند و به صف دیگر با استفاده از </a:t>
-            </a:r>
-            <a:r>
-              <a:rPr lang="en-US" sz="1800" dirty="0">
-                <a:effectLst/>
-                <a:latin typeface="IRANSans" panose="020B0506030804020204" pitchFamily="34" charset="-78"/>
-                <a:ea typeface="Calibri" panose="020F0502020204030204" pitchFamily="34" charset="0"/>
-                <a:cs typeface="Arial" panose="020B0604020202020204" pitchFamily="34" charset="0"/>
-              </a:rPr>
-              <a:t>pointer this</a:t>
-            </a:r>
-            <a:r>
-              <a:rPr lang="fa-IR" dirty="0">
-                <a:latin typeface="IRANSans" panose="020B0506030804020204" pitchFamily="34" charset="-78"/>
-                <a:ea typeface="Calibri" panose="020F0502020204030204" pitchFamily="34" charset="0"/>
-                <a:cs typeface="Arial" panose="020B0604020202020204" pitchFamily="34" charset="0"/>
-              </a:rPr>
-              <a:t>  دسترسی دارد </a:t>
+                <a:cs typeface="Calibri" panose="020F0502020204030204" pitchFamily="34" charset="0"/>
+              </a:rPr>
+              <a:t> دسترسی دارد.</a:t>
             </a:r>
           </a:p>
           <a:p>
@@ -11636,48 +11659,18 @@
               </a:spcAft>
             </a:pPr>
             <a:r>
-              <a:rPr lang="fa-IR" dirty="0">
+              <a:rPr lang="fa-IR" sz="2000" dirty="0">
                 <a:latin typeface="Calibri" panose="020F0502020204030204" pitchFamily="34" charset="0"/>
                 <a:ea typeface="Calibri" panose="020F0502020204030204" pitchFamily="34" charset="0"/>
-                <a:cs typeface="Arial" panose="020B0604020202020204" pitchFamily="34" charset="0"/>
-              </a:rPr>
-              <a:t>این توابع دو صف را با هم ادغام میکند و در خروجی نتیجه آن را بر میگرداند.</a:t>
-            </a:r>
-            <a:endParaRPr lang="en-US" sz="1800" dirty="0">
+                <a:cs typeface="Calibri" panose="020F0502020204030204" pitchFamily="34" charset="0"/>
+              </a:rPr>
+              <a:t>این توابع دو صف را با هم ادغام می کند و در خروجی نتیجه آن را بر می گرداند.</a:t>
+            </a:r>
+            <a:endParaRPr lang="en-US" sz="2000" dirty="0">
               <a:effectLst/>
               <a:latin typeface="Calibri" panose="020F0502020204030204" pitchFamily="34" charset="0"/>
               <a:ea typeface="Calibri" panose="020F0502020204030204" pitchFamily="34" charset="0"/>
-              <a:cs typeface="Arial" panose="020B0604020202020204" pitchFamily="34" charset="0"/>
-            </a:endParaRPr>
-          </a:p>
-          <a:p>
-            <a:pPr marL="0" marR="0">
-              <a:lnSpc>
-                <a:spcPct val="107000"/>
-              </a:lnSpc>
-              <a:spcBef>
-                <a:spcPts val="0"/>
-              </a:spcBef>
-              <a:spcAft>
-                <a:spcPts val="800"/>
-              </a:spcAft>
-            </a:pPr>
-            <a:endParaRPr lang="en-US" sz="1500" dirty="0">
-              <a:effectLst/>
-              <a:latin typeface="Calibri" panose="020F0502020204030204" pitchFamily="34" charset="0"/>
-              <a:ea typeface="Calibri" panose="020F0502020204030204" pitchFamily="34" charset="0"/>
-              <a:cs typeface="Arial" panose="020B0604020202020204" pitchFamily="34" charset="0"/>
-            </a:endParaRPr>
-          </a:p>
-          <a:p>
-            <a:pPr algn="r" rtl="1"/>
-            <a:endParaRPr lang="fa-IR" sz="1500" b="0" i="0" dirty="0">
-              <a:solidFill>
-                <a:srgbClr val="202122"/>
-              </a:solidFill>
-              <a:effectLst/>
-              <a:latin typeface="IRANSans" panose="020B0506030804020204" pitchFamily="34" charset="-78"/>
-              <a:cs typeface="IRANSans" panose="020B0506030804020204" pitchFamily="34" charset="-78"/>
+              <a:cs typeface="Calibri" panose="020F0502020204030204" pitchFamily="34" charset="0"/>
             </a:endParaRPr>
           </a:p>
         </p:txBody>
@@ -11709,11 +11702,17 @@
           <a:lstStyle/>
           <a:p>
             <a:fld id="{8B48EBF6-60E6-462A-9155-5FAF136BCCBC}" type="slidenum">
-              <a:rPr lang="en-US" smtClean="0"/>
+              <a:rPr lang="en-US" smtClean="0">
+                <a:latin typeface="Calibri" panose="020F0502020204030204" pitchFamily="34" charset="0"/>
+                <a:cs typeface="Calibri" panose="020F0502020204030204" pitchFamily="34" charset="0"/>
+              </a:rPr>
               <a:pPr/>
               <a:t>12</a:t>
             </a:fld>
-            <a:endParaRPr lang="en-US" dirty="0"/>
+            <a:endParaRPr lang="en-US" dirty="0">
+              <a:latin typeface="Calibri" panose="020F0502020204030204" pitchFamily="34" charset="0"/>
+              <a:cs typeface="Calibri" panose="020F0502020204030204" pitchFamily="34" charset="0"/>
+            </a:endParaRPr>
           </a:p>
         </p:txBody>
       </p:sp>
@@ -11747,13 +11746,13 @@
           <a:p>
             <a:pPr algn="ctr" rtl="1"/>
             <a:r>
-              <a:rPr lang="fa-IR" sz="2800" b="0" i="0" dirty="0">
+              <a:rPr lang="fa-IR" sz="2800" b="1" i="0" dirty="0">
                 <a:solidFill>
                   <a:srgbClr val="EB5A64"/>
                 </a:solidFill>
                 <a:effectLst/>
-                <a:latin typeface="IRANSans" panose="020B0506030804020204" pitchFamily="34" charset="-78"/>
-                <a:cs typeface="IRANSans" panose="020B0506030804020204" pitchFamily="34" charset="-78"/>
+                <a:latin typeface="Calibri" panose="020F0502020204030204" pitchFamily="34" charset="0"/>
+                <a:cs typeface="Calibri" panose="020F0502020204030204" pitchFamily="34" charset="0"/>
               </a:rPr>
               <a:t>ادغام دو صف :</a:t>
             </a:r>
@@ -11816,6 +11815,8 @@
                 <a:solidFill>
                   <a:schemeClr val="bg1"/>
                 </a:solidFill>
+                <a:latin typeface="Calibri" panose="020F0502020204030204" pitchFamily="34" charset="0"/>
+                <a:cs typeface="Calibri" panose="020F0502020204030204" pitchFamily="34" charset="0"/>
               </a:rPr>
               <a:t>Sample Footer Text</a:t>
             </a:r>
@@ -11823,6 +11824,8 @@
               <a:solidFill>
                 <a:schemeClr val="bg1"/>
               </a:solidFill>
+              <a:latin typeface="Calibri" panose="020F0502020204030204" pitchFamily="34" charset="0"/>
+              <a:cs typeface="Calibri" panose="020F0502020204030204" pitchFamily="34" charset="0"/>
             </a:endParaRPr>
           </a:p>
         </p:txBody>
@@ -11849,10 +11852,16 @@
           <a:lstStyle/>
           <a:p>
             <a:fld id="{C01389E6-C847-4AD0-B56D-D205B2EAB1EE}" type="slidenum">
-              <a:rPr lang="en-US" smtClean="0"/>
+              <a:rPr lang="en-US" smtClean="0">
+                <a:latin typeface="Calibri" panose="020F0502020204030204" pitchFamily="34" charset="0"/>
+                <a:cs typeface="Calibri" panose="020F0502020204030204" pitchFamily="34" charset="0"/>
+              </a:rPr>
               <a:t>13</a:t>
             </a:fld>
-            <a:endParaRPr lang="en-US" dirty="0"/>
+            <a:endParaRPr lang="en-US" dirty="0">
+              <a:latin typeface="Calibri" panose="020F0502020204030204" pitchFamily="34" charset="0"/>
+              <a:cs typeface="Calibri" panose="020F0502020204030204" pitchFamily="34" charset="0"/>
+            </a:endParaRPr>
           </a:p>
         </p:txBody>
       </p:sp>
@@ -11870,7 +11879,7 @@
         </p:nvSpPr>
         <p:spPr>
           <a:xfrm>
-            <a:off x="3048000" y="219730"/>
+            <a:off x="3048000" y="370732"/>
             <a:ext cx="6096000" cy="523220"/>
           </a:xfrm>
           <a:prstGeom prst="rect">
@@ -11886,13 +11895,13 @@
           <a:p>
             <a:pPr algn="ctr" rtl="1"/>
             <a:r>
-              <a:rPr lang="fa-IR" sz="2800" b="0" i="0" dirty="0">
+              <a:rPr lang="fa-IR" sz="2800" b="1" i="0" dirty="0">
                 <a:solidFill>
                   <a:srgbClr val="EB5A64"/>
                 </a:solidFill>
                 <a:effectLst/>
-                <a:latin typeface="IRANSans" panose="020B0506030804020204" pitchFamily="34" charset="-78"/>
-                <a:cs typeface="IRANSans" panose="020B0506030804020204" pitchFamily="34" charset="-78"/>
+                <a:latin typeface="Calibri" panose="020F0502020204030204" pitchFamily="34" charset="0"/>
+                <a:cs typeface="Calibri" panose="020F0502020204030204" pitchFamily="34" charset="0"/>
               </a:rPr>
               <a:t>تحلیل صف خطی با لیست پیوندی</a:t>
             </a:r>
@@ -11917,8 +11926,8 @@
         </p:nvSpPr>
         <p:spPr>
           <a:xfrm>
-            <a:off x="2103120" y="1743891"/>
-            <a:ext cx="7985760" cy="4401932"/>
+            <a:off x="1795244" y="1228034"/>
+            <a:ext cx="8397380" cy="4401932"/>
           </a:xfrm>
         </p:spPr>
         <p:txBody>
@@ -11929,45 +11938,45 @@
           <a:p>
             <a:pPr algn="r" rtl="1"/>
             <a:r>
-              <a:rPr lang="fa-IR" sz="1500" dirty="0">
-                <a:solidFill>
-                  <a:srgbClr val="202122"/>
-                </a:solidFill>
-                <a:latin typeface="IRANSans" panose="020B0506030804020204" pitchFamily="34" charset="-78"/>
-                <a:cs typeface="IRANSans" panose="020B0506030804020204" pitchFamily="34" charset="-78"/>
-              </a:rPr>
-              <a:t>پیچیده گی زمانی توابع این ساختمان داده :</a:t>
+              <a:rPr lang="fa-IR" dirty="0">
+                <a:solidFill>
+                  <a:srgbClr val="7030A0"/>
+                </a:solidFill>
+                <a:latin typeface="Calibri" panose="020F0502020204030204" pitchFamily="34" charset="0"/>
+                <a:cs typeface="Calibri" panose="020F0502020204030204" pitchFamily="34" charset="0"/>
+              </a:rPr>
+              <a:t>پیچیدگی زمانی توابع این ساختمان داده :</a:t>
             </a:r>
           </a:p>
           <a:p>
             <a:pPr algn="r" rtl="1"/>
             <a:r>
-              <a:rPr lang="fa-IR" sz="1500" dirty="0">
-                <a:solidFill>
-                  <a:srgbClr val="202122"/>
-                </a:solidFill>
-                <a:latin typeface="IRANSans" panose="020B0506030804020204" pitchFamily="34" charset="-78"/>
-                <a:cs typeface="IRANSans" panose="020B0506030804020204" pitchFamily="34" charset="-78"/>
+              <a:rPr lang="fa-IR" dirty="0">
+                <a:solidFill>
+                  <a:srgbClr val="7030A0"/>
+                </a:solidFill>
+                <a:latin typeface="Calibri" panose="020F0502020204030204" pitchFamily="34" charset="0"/>
+                <a:cs typeface="Calibri" panose="020F0502020204030204" pitchFamily="34" charset="0"/>
               </a:rPr>
               <a:t>درصورت استفاده از دو </a:t>
             </a:r>
             <a:r>
-              <a:rPr lang="en-US" sz="1500" dirty="0">
-                <a:solidFill>
-                  <a:srgbClr val="202122"/>
-                </a:solidFill>
-                <a:latin typeface="IRANSans" panose="020B0506030804020204" pitchFamily="34" charset="-78"/>
-                <a:cs typeface="IRANSans" panose="020B0506030804020204" pitchFamily="34" charset="-78"/>
+              <a:rPr lang="en-US" dirty="0">
+                <a:solidFill>
+                  <a:srgbClr val="7030A0"/>
+                </a:solidFill>
+                <a:latin typeface="Calibri" panose="020F0502020204030204" pitchFamily="34" charset="0"/>
+                <a:cs typeface="Calibri" panose="020F0502020204030204" pitchFamily="34" charset="0"/>
               </a:rPr>
               <a:t>pointer</a:t>
             </a:r>
             <a:r>
-              <a:rPr lang="fa-IR" sz="1500" dirty="0">
-                <a:solidFill>
-                  <a:srgbClr val="202122"/>
-                </a:solidFill>
-                <a:latin typeface="IRANSans" panose="020B0506030804020204" pitchFamily="34" charset="-78"/>
-                <a:cs typeface="IRANSans" panose="020B0506030804020204" pitchFamily="34" charset="-78"/>
+              <a:rPr lang="fa-IR" dirty="0">
+                <a:solidFill>
+                  <a:srgbClr val="7030A0"/>
+                </a:solidFill>
+                <a:latin typeface="Calibri" panose="020F0502020204030204" pitchFamily="34" charset="0"/>
+                <a:cs typeface="Calibri" panose="020F0502020204030204" pitchFamily="34" charset="0"/>
               </a:rPr>
               <a:t> به ابتدا و انتها</a:t>
             </a:r>
@@ -11978,24 +11987,24 @@
               <a:buChar char="-"/>
             </a:pPr>
             <a:r>
-              <a:rPr lang="fa-IR" sz="1500" b="0" i="0" dirty="0">
+              <a:rPr lang="fa-IR" b="0" i="0" dirty="0">
                 <a:solidFill>
                   <a:srgbClr val="202122"/>
                 </a:solidFill>
                 <a:effectLst/>
-                <a:latin typeface="IRANSans" panose="020B0506030804020204" pitchFamily="34" charset="-78"/>
-                <a:cs typeface="IRANSans" panose="020B0506030804020204" pitchFamily="34" charset="-78"/>
+                <a:latin typeface="Calibri" panose="020F0502020204030204" pitchFamily="34" charset="0"/>
+                <a:cs typeface="Calibri" panose="020F0502020204030204" pitchFamily="34" charset="0"/>
               </a:rPr>
               <a:t>اضافه کردن </a:t>
             </a:r>
             <a:r>
-              <a:rPr lang="en-US" sz="1500" b="0" i="0" dirty="0">
+              <a:rPr lang="en-US" b="0" i="0" dirty="0">
                 <a:solidFill>
                   <a:srgbClr val="202122"/>
                 </a:solidFill>
                 <a:effectLst/>
-                <a:latin typeface="IRANSans" panose="020B0506030804020204" pitchFamily="34" charset="-78"/>
-                <a:cs typeface="IRANSans" panose="020B0506030804020204" pitchFamily="34" charset="-78"/>
+                <a:latin typeface="Calibri" panose="020F0502020204030204" pitchFamily="34" charset="0"/>
+                <a:cs typeface="Calibri" panose="020F0502020204030204" pitchFamily="34" charset="0"/>
               </a:rPr>
               <a:t>O(1)</a:t>
             </a:r>
@@ -12006,32 +12015,32 @@
               <a:buChar char="-"/>
             </a:pPr>
             <a:r>
-              <a:rPr lang="fa-IR" sz="1500" dirty="0">
+              <a:rPr lang="fa-IR" dirty="0">
                 <a:solidFill>
                   <a:srgbClr val="202122"/>
                 </a:solidFill>
-                <a:latin typeface="IRANSans" panose="020B0506030804020204" pitchFamily="34" charset="-78"/>
-                <a:cs typeface="IRANSans" panose="020B0506030804020204" pitchFamily="34" charset="-78"/>
+                <a:latin typeface="Calibri" panose="020F0502020204030204" pitchFamily="34" charset="0"/>
+                <a:cs typeface="Calibri" panose="020F0502020204030204" pitchFamily="34" charset="0"/>
               </a:rPr>
               <a:t>حذف کردن </a:t>
             </a:r>
             <a:r>
-              <a:rPr lang="en-US" sz="1500" b="0" i="0" dirty="0">
+              <a:rPr lang="en-US" b="0" i="0" dirty="0">
                 <a:solidFill>
                   <a:srgbClr val="202122"/>
                 </a:solidFill>
                 <a:effectLst/>
-                <a:latin typeface="IRANSans" panose="020B0506030804020204" pitchFamily="34" charset="-78"/>
-                <a:cs typeface="IRANSans" panose="020B0506030804020204" pitchFamily="34" charset="-78"/>
+                <a:latin typeface="Calibri" panose="020F0502020204030204" pitchFamily="34" charset="0"/>
+                <a:cs typeface="Calibri" panose="020F0502020204030204" pitchFamily="34" charset="0"/>
               </a:rPr>
               <a:t>O(1)</a:t>
             </a:r>
-            <a:endParaRPr lang="fa-IR" sz="1500" dirty="0">
+            <a:endParaRPr lang="fa-IR" dirty="0">
               <a:solidFill>
                 <a:srgbClr val="202122"/>
               </a:solidFill>
-              <a:latin typeface="IRANSans" panose="020B0506030804020204" pitchFamily="34" charset="-78"/>
-              <a:cs typeface="IRANSans" panose="020B0506030804020204" pitchFamily="34" charset="-78"/>
+              <a:latin typeface="Calibri" panose="020F0502020204030204" pitchFamily="34" charset="0"/>
+              <a:cs typeface="Calibri" panose="020F0502020204030204" pitchFamily="34" charset="0"/>
             </a:endParaRPr>
           </a:p>
           <a:p>
@@ -12040,34 +12049,34 @@
               <a:buChar char="-"/>
             </a:pPr>
             <a:r>
-              <a:rPr lang="fa-IR" sz="1500" b="0" i="0" dirty="0">
+              <a:rPr lang="fa-IR" b="0" i="0" dirty="0">
                 <a:solidFill>
                   <a:srgbClr val="202122"/>
                 </a:solidFill>
                 <a:effectLst/>
-                <a:latin typeface="IRANSans" panose="020B0506030804020204" pitchFamily="34" charset="-78"/>
-                <a:cs typeface="IRANSans" panose="020B0506030804020204" pitchFamily="34" charset="-78"/>
+                <a:latin typeface="Calibri" panose="020F0502020204030204" pitchFamily="34" charset="0"/>
+                <a:cs typeface="Calibri" panose="020F0502020204030204" pitchFamily="34" charset="0"/>
               </a:rPr>
               <a:t>جستجو </a:t>
             </a:r>
             <a:r>
-              <a:rPr lang="en-US" sz="1500" b="0" i="0" dirty="0">
+              <a:rPr lang="en-US" b="0" i="0" dirty="0">
                 <a:solidFill>
                   <a:srgbClr val="202122"/>
                 </a:solidFill>
                 <a:effectLst/>
-                <a:latin typeface="IRANSans" panose="020B0506030804020204" pitchFamily="34" charset="-78"/>
-                <a:cs typeface="IRANSans" panose="020B0506030804020204" pitchFamily="34" charset="-78"/>
+                <a:latin typeface="Calibri" panose="020F0502020204030204" pitchFamily="34" charset="0"/>
+                <a:cs typeface="Calibri" panose="020F0502020204030204" pitchFamily="34" charset="0"/>
               </a:rPr>
               <a:t>O(n)</a:t>
             </a:r>
-            <a:endParaRPr lang="fa-IR" sz="1500" b="0" i="0" dirty="0">
+            <a:endParaRPr lang="fa-IR" b="0" i="0" dirty="0">
               <a:solidFill>
                 <a:srgbClr val="202122"/>
               </a:solidFill>
               <a:effectLst/>
-              <a:latin typeface="IRANSans" panose="020B0506030804020204" pitchFamily="34" charset="-78"/>
-              <a:cs typeface="IRANSans" panose="020B0506030804020204" pitchFamily="34" charset="-78"/>
+              <a:latin typeface="Calibri" panose="020F0502020204030204" pitchFamily="34" charset="0"/>
+              <a:cs typeface="Calibri" panose="020F0502020204030204" pitchFamily="34" charset="0"/>
             </a:endParaRPr>
           </a:p>
           <a:p>
@@ -12076,33 +12085,33 @@
               <a:buChar char="-"/>
             </a:pPr>
             <a:r>
-              <a:rPr lang="fa-IR" sz="1500" dirty="0" err="1">
+              <a:rPr lang="fa-IR" dirty="0" err="1">
                 <a:solidFill>
                   <a:srgbClr val="202122"/>
                 </a:solidFill>
-                <a:latin typeface="IRANSans" panose="020B0506030804020204" pitchFamily="34" charset="-78"/>
-                <a:cs typeface="IRANSans" panose="020B0506030804020204" pitchFamily="34" charset="-78"/>
+                <a:latin typeface="Calibri" panose="020F0502020204030204" pitchFamily="34" charset="0"/>
+                <a:cs typeface="Calibri" panose="020F0502020204030204" pitchFamily="34" charset="0"/>
               </a:rPr>
               <a:t>مرج</a:t>
             </a:r>
             <a:r>
-              <a:rPr lang="fa-IR" sz="1500" dirty="0">
+              <a:rPr lang="fa-IR" dirty="0">
                 <a:solidFill>
                   <a:srgbClr val="202122"/>
                 </a:solidFill>
-                <a:latin typeface="IRANSans" panose="020B0506030804020204" pitchFamily="34" charset="-78"/>
-                <a:cs typeface="IRANSans" panose="020B0506030804020204" pitchFamily="34" charset="-78"/>
+                <a:latin typeface="Calibri" panose="020F0502020204030204" pitchFamily="34" charset="0"/>
+                <a:cs typeface="Calibri" panose="020F0502020204030204" pitchFamily="34" charset="0"/>
               </a:rPr>
               <a:t> </a:t>
             </a:r>
             <a:r>
-              <a:rPr lang="en-US" sz="1500" b="0" i="0" dirty="0">
+              <a:rPr lang="en-US" b="0" i="0" dirty="0">
                 <a:solidFill>
                   <a:srgbClr val="202122"/>
                 </a:solidFill>
                 <a:effectLst/>
-                <a:latin typeface="IRANSans" panose="020B0506030804020204" pitchFamily="34" charset="-78"/>
-                <a:cs typeface="IRANSans" panose="020B0506030804020204" pitchFamily="34" charset="-78"/>
+                <a:latin typeface="Calibri" panose="020F0502020204030204" pitchFamily="34" charset="0"/>
+                <a:cs typeface="Calibri" panose="020F0502020204030204" pitchFamily="34" charset="0"/>
               </a:rPr>
               <a:t>O(n)</a:t>
             </a:r>
@@ -12110,32 +12119,32 @@
           <a:p>
             <a:pPr algn="r" rtl="1"/>
             <a:r>
-              <a:rPr lang="fa-IR" sz="1500" dirty="0">
+              <a:rPr lang="fa-IR" dirty="0">
                 <a:solidFill>
                   <a:srgbClr val="202122"/>
                 </a:solidFill>
-                <a:latin typeface="IRANSans" panose="020B0506030804020204" pitchFamily="34" charset="-78"/>
-                <a:cs typeface="IRANSans" panose="020B0506030804020204" pitchFamily="34" charset="-78"/>
-              </a:rPr>
-              <a:t>در صورتی که از یک </a:t>
-            </a:r>
-            <a:r>
-              <a:rPr lang="en-US" sz="1500" dirty="0">
+                <a:latin typeface="Calibri" panose="020F0502020204030204" pitchFamily="34" charset="0"/>
+                <a:cs typeface="Calibri" panose="020F0502020204030204" pitchFamily="34" charset="0"/>
+              </a:rPr>
+              <a:t>در صورتی که از یک</a:t>
+            </a:r>
+            <a:r>
+              <a:rPr lang="en-US" dirty="0">
                 <a:solidFill>
                   <a:srgbClr val="202122"/>
                 </a:solidFill>
-                <a:latin typeface="IRANSans" panose="020B0506030804020204" pitchFamily="34" charset="-78"/>
-                <a:cs typeface="IRANSans" panose="020B0506030804020204" pitchFamily="34" charset="-78"/>
+                <a:latin typeface="Calibri" panose="020F0502020204030204" pitchFamily="34" charset="0"/>
+                <a:cs typeface="Calibri" panose="020F0502020204030204" pitchFamily="34" charset="0"/>
               </a:rPr>
               <a:t>pointer </a:t>
             </a:r>
             <a:r>
-              <a:rPr lang="fa-IR" sz="1500" dirty="0">
+              <a:rPr lang="fa-IR" dirty="0">
                 <a:solidFill>
                   <a:srgbClr val="202122"/>
                 </a:solidFill>
-                <a:latin typeface="IRANSans" panose="020B0506030804020204" pitchFamily="34" charset="-78"/>
-                <a:cs typeface="IRANSans" panose="020B0506030804020204" pitchFamily="34" charset="-78"/>
+                <a:latin typeface="Calibri" panose="020F0502020204030204" pitchFamily="34" charset="0"/>
+                <a:cs typeface="Calibri" panose="020F0502020204030204" pitchFamily="34" charset="0"/>
               </a:rPr>
               <a:t> به ابتدا استفاده شود برای دسترسی به انتهای صف باید از یک حلقه استفاده کنیم پس پیچیدگی زمانی متفاوتی خواهیم داشت .</a:t>
             </a:r>
@@ -12143,53 +12152,53 @@
           <a:p>
             <a:pPr algn="r" rtl="1"/>
             <a:r>
-              <a:rPr lang="fa-IR" sz="1500" b="0" i="0" dirty="0">
+              <a:rPr lang="fa-IR" b="0" i="0" dirty="0">
                 <a:solidFill>
                   <a:srgbClr val="202122"/>
                 </a:solidFill>
                 <a:effectLst/>
-                <a:latin typeface="IRANSans" panose="020B0506030804020204" pitchFamily="34" charset="-78"/>
-                <a:cs typeface="IRANSans" panose="020B0506030804020204" pitchFamily="34" charset="-78"/>
+                <a:latin typeface="Calibri" panose="020F0502020204030204" pitchFamily="34" charset="0"/>
+                <a:cs typeface="Calibri" panose="020F0502020204030204" pitchFamily="34" charset="0"/>
               </a:rPr>
               <a:t>حاف</a:t>
             </a:r>
             <a:r>
-              <a:rPr lang="fa-IR" sz="1500" dirty="0">
+              <a:rPr lang="fa-IR" dirty="0">
                 <a:solidFill>
                   <a:srgbClr val="202122"/>
                 </a:solidFill>
-                <a:latin typeface="IRANSans" panose="020B0506030804020204" pitchFamily="34" charset="-78"/>
-                <a:cs typeface="IRANSans" panose="020B0506030804020204" pitchFamily="34" charset="-78"/>
+                <a:latin typeface="Calibri" panose="020F0502020204030204" pitchFamily="34" charset="0"/>
+                <a:cs typeface="Calibri" panose="020F0502020204030204" pitchFamily="34" charset="0"/>
               </a:rPr>
               <a:t>ظه مورد استفاده در این ساختمان داده : </a:t>
             </a:r>
             <a:r>
-              <a:rPr lang="en-US" sz="1500" dirty="0">
+              <a:rPr lang="en-US" dirty="0">
                 <a:solidFill>
                   <a:srgbClr val="202122"/>
                 </a:solidFill>
-                <a:latin typeface="IRANSans" panose="020B0506030804020204" pitchFamily="34" charset="-78"/>
-                <a:cs typeface="IRANSans" panose="020B0506030804020204" pitchFamily="34" charset="-78"/>
+                <a:latin typeface="Calibri" panose="020F0502020204030204" pitchFamily="34" charset="0"/>
+                <a:cs typeface="Calibri" panose="020F0502020204030204" pitchFamily="34" charset="0"/>
               </a:rPr>
               <a:t>n*size(node)</a:t>
             </a:r>
             <a:r>
-              <a:rPr lang="fa-IR" sz="1500" dirty="0">
+              <a:rPr lang="fa-IR" dirty="0">
                 <a:solidFill>
                   <a:srgbClr val="202122"/>
                 </a:solidFill>
-                <a:latin typeface="IRANSans" panose="020B0506030804020204" pitchFamily="34" charset="-78"/>
-                <a:cs typeface="IRANSans" panose="020B0506030804020204" pitchFamily="34" charset="-78"/>
+                <a:latin typeface="Calibri" panose="020F0502020204030204" pitchFamily="34" charset="0"/>
+                <a:cs typeface="Calibri" panose="020F0502020204030204" pitchFamily="34" charset="0"/>
               </a:rPr>
               <a:t> </a:t>
             </a:r>
-            <a:endParaRPr lang="en-US" sz="1500" b="0" i="0" dirty="0">
+            <a:endParaRPr lang="en-US" b="0" i="0" dirty="0">
               <a:solidFill>
                 <a:srgbClr val="202122"/>
               </a:solidFill>
               <a:effectLst/>
-              <a:latin typeface="IRANSans" panose="020B0506030804020204" pitchFamily="34" charset="-78"/>
-              <a:cs typeface="IRANSans" panose="020B0506030804020204" pitchFamily="34" charset="-78"/>
+              <a:latin typeface="Calibri" panose="020F0502020204030204" pitchFamily="34" charset="0"/>
+              <a:cs typeface="Calibri" panose="020F0502020204030204" pitchFamily="34" charset="0"/>
             </a:endParaRPr>
           </a:p>
         </p:txBody>
@@ -12250,6 +12259,8 @@
                 <a:solidFill>
                   <a:schemeClr val="bg1"/>
                 </a:solidFill>
+                <a:latin typeface="Calibri" panose="020F0502020204030204" pitchFamily="34" charset="0"/>
+                <a:cs typeface="Calibri" panose="020F0502020204030204" pitchFamily="34" charset="0"/>
               </a:rPr>
               <a:t>Sample Footer Text</a:t>
             </a:r>
@@ -12257,6 +12268,8 @@
               <a:solidFill>
                 <a:schemeClr val="bg1"/>
               </a:solidFill>
+              <a:latin typeface="Calibri" panose="020F0502020204030204" pitchFamily="34" charset="0"/>
+              <a:cs typeface="Calibri" panose="020F0502020204030204" pitchFamily="34" charset="0"/>
             </a:endParaRPr>
           </a:p>
         </p:txBody>
@@ -12283,10 +12296,16 @@
           <a:lstStyle/>
           <a:p>
             <a:fld id="{C01389E6-C847-4AD0-B56D-D205B2EAB1EE}" type="slidenum">
-              <a:rPr lang="en-US" smtClean="0"/>
+              <a:rPr lang="en-US" smtClean="0">
+                <a:latin typeface="Calibri" panose="020F0502020204030204" pitchFamily="34" charset="0"/>
+                <a:cs typeface="Calibri" panose="020F0502020204030204" pitchFamily="34" charset="0"/>
+              </a:rPr>
               <a:t>14</a:t>
             </a:fld>
-            <a:endParaRPr lang="en-US" dirty="0"/>
+            <a:endParaRPr lang="en-US" dirty="0">
+              <a:latin typeface="Calibri" panose="020F0502020204030204" pitchFamily="34" charset="0"/>
+              <a:cs typeface="Calibri" panose="020F0502020204030204" pitchFamily="34" charset="0"/>
+            </a:endParaRPr>
           </a:p>
         </p:txBody>
       </p:sp>
@@ -12304,7 +12323,7 @@
         </p:nvSpPr>
         <p:spPr>
           <a:xfrm>
-            <a:off x="3048000" y="219730"/>
+            <a:off x="3048000" y="450567"/>
             <a:ext cx="6096000" cy="523220"/>
           </a:xfrm>
           <a:prstGeom prst="rect">
@@ -12320,13 +12339,13 @@
           <a:p>
             <a:pPr algn="ctr" rtl="1"/>
             <a:r>
-              <a:rPr lang="fa-IR" sz="2800" b="0" i="0" dirty="0">
+              <a:rPr lang="fa-IR" sz="2800" b="1" i="0" dirty="0">
                 <a:solidFill>
                   <a:srgbClr val="EB5A64"/>
                 </a:solidFill>
                 <a:effectLst/>
-                <a:latin typeface="IRANSans" panose="020B0506030804020204" pitchFamily="34" charset="-78"/>
-                <a:cs typeface="IRANSans" panose="020B0506030804020204" pitchFamily="34" charset="-78"/>
+                <a:latin typeface="Calibri" panose="020F0502020204030204" pitchFamily="34" charset="0"/>
+                <a:cs typeface="Calibri" panose="020F0502020204030204" pitchFamily="34" charset="0"/>
               </a:rPr>
               <a:t>تحلیل صف اولویت دار با لیست پیوندی</a:t>
             </a:r>
@@ -12363,113 +12382,183 @@
           <a:p>
             <a:pPr algn="r" rtl="1"/>
             <a:r>
-              <a:rPr lang="fa-IR" sz="1500" dirty="0">
+              <a:rPr lang="fa-IR" sz="2000" dirty="0">
+                <a:solidFill>
+                  <a:srgbClr val="7030A0"/>
+                </a:solidFill>
+                <a:latin typeface="Calibri" panose="020F0502020204030204" pitchFamily="34" charset="0"/>
+                <a:cs typeface="Calibri" panose="020F0502020204030204" pitchFamily="34" charset="0"/>
+              </a:rPr>
+              <a:t>پیچیدگی زمانی توابع این ساختمان داده :</a:t>
+            </a:r>
+          </a:p>
+          <a:p>
+            <a:pPr algn="r" rtl="1"/>
+            <a:r>
+              <a:rPr lang="fa-IR" dirty="0">
                 <a:solidFill>
                   <a:srgbClr val="202122"/>
                 </a:solidFill>
-                <a:latin typeface="IRANSans" panose="020B0506030804020204" pitchFamily="34" charset="-78"/>
-                <a:cs typeface="IRANSans" panose="020B0506030804020204" pitchFamily="34" charset="-78"/>
-              </a:rPr>
-              <a:t>پیچیده گی زمانی توابع این ساختمان داده :</a:t>
+                <a:latin typeface="Calibri" panose="020F0502020204030204" pitchFamily="34" charset="0"/>
+                <a:cs typeface="Calibri" panose="020F0502020204030204" pitchFamily="34" charset="0"/>
+              </a:rPr>
+              <a:t>تفاوتی که این نوع صف با صف معمولی دارد در این است که ما باید در اضافه کردن یا حذف کردن اولویت نود ها را بررسی کنیم پس پیچیدگی</a:t>
+            </a:r>
+            <a:r>
+              <a:rPr lang="en-US" dirty="0">
+                <a:solidFill>
+                  <a:srgbClr val="202122"/>
+                </a:solidFill>
+                <a:latin typeface="Calibri" panose="020F0502020204030204" pitchFamily="34" charset="0"/>
+                <a:cs typeface="Calibri" panose="020F0502020204030204" pitchFamily="34" charset="0"/>
+              </a:rPr>
+              <a:t> </a:t>
+            </a:r>
+            <a:r>
+              <a:rPr lang="fa-IR" dirty="0">
+                <a:solidFill>
+                  <a:srgbClr val="202122"/>
+                </a:solidFill>
+                <a:latin typeface="Calibri" panose="020F0502020204030204" pitchFamily="34" charset="0"/>
+                <a:cs typeface="Calibri" panose="020F0502020204030204" pitchFamily="34" charset="0"/>
+              </a:rPr>
+              <a:t>این توابع</a:t>
+            </a:r>
+            <a:r>
+              <a:rPr lang="en-US" dirty="0">
+                <a:solidFill>
+                  <a:srgbClr val="202122"/>
+                </a:solidFill>
+                <a:latin typeface="Calibri" panose="020F0502020204030204" pitchFamily="34" charset="0"/>
+                <a:cs typeface="Calibri" panose="020F0502020204030204" pitchFamily="34" charset="0"/>
+              </a:rPr>
+              <a:t>o(n) </a:t>
+            </a:r>
+            <a:r>
+              <a:rPr lang="fa-IR" dirty="0">
+                <a:solidFill>
+                  <a:srgbClr val="202122"/>
+                </a:solidFill>
+                <a:latin typeface="Calibri" panose="020F0502020204030204" pitchFamily="34" charset="0"/>
+                <a:cs typeface="Calibri" panose="020F0502020204030204" pitchFamily="34" charset="0"/>
+              </a:rPr>
+              <a:t> خواهد شد.</a:t>
             </a:r>
           </a:p>
           <a:p>
             <a:pPr algn="r" rtl="1"/>
             <a:r>
-              <a:rPr lang="fa-IR" sz="1500" dirty="0">
+              <a:rPr lang="fa-IR" dirty="0">
                 <a:solidFill>
                   <a:srgbClr val="202122"/>
                 </a:solidFill>
-                <a:latin typeface="IRANSans" panose="020B0506030804020204" pitchFamily="34" charset="-78"/>
-                <a:cs typeface="IRANSans" panose="020B0506030804020204" pitchFamily="34" charset="-78"/>
-              </a:rPr>
-              <a:t>تفاوتی که این نوع صف با صف معمولی دارد در این است که ما باید در اضافه کردن یا حذف کردن اولویت نود ها را بررسی کنیم پس پیچیدگی </a:t>
-            </a:r>
-            <a:r>
-              <a:rPr lang="fa-IR" sz="1500" dirty="0" err="1">
+                <a:latin typeface="Calibri" panose="020F0502020204030204" pitchFamily="34" charset="0"/>
+                <a:cs typeface="Calibri" panose="020F0502020204030204" pitchFamily="34" charset="0"/>
+              </a:rPr>
+              <a:t>نکته دیگر در مورد این نوع صف این است که ما می</a:t>
+            </a:r>
+            <a:r>
+              <a:rPr lang="en-US" dirty="0">
                 <a:solidFill>
                   <a:srgbClr val="202122"/>
                 </a:solidFill>
-                <a:latin typeface="IRANSans" panose="020B0506030804020204" pitchFamily="34" charset="-78"/>
-                <a:cs typeface="IRANSans" panose="020B0506030804020204" pitchFamily="34" charset="-78"/>
-              </a:rPr>
-              <a:t>یه</a:t>
-            </a:r>
-            <a:r>
-              <a:rPr lang="fa-IR" sz="1500" dirty="0">
+                <a:latin typeface="Calibri" panose="020F0502020204030204" pitchFamily="34" charset="0"/>
+                <a:cs typeface="Calibri" panose="020F0502020204030204" pitchFamily="34" charset="0"/>
+              </a:rPr>
+              <a:t> </a:t>
+            </a:r>
+            <a:r>
+              <a:rPr lang="fa-IR" dirty="0">
                 <a:solidFill>
                   <a:srgbClr val="202122"/>
                 </a:solidFill>
-                <a:latin typeface="IRANSans" panose="020B0506030804020204" pitchFamily="34" charset="-78"/>
-                <a:cs typeface="IRANSans" panose="020B0506030804020204" pitchFamily="34" charset="-78"/>
-              </a:rPr>
-              <a:t> از این توابع </a:t>
-            </a:r>
-            <a:r>
-              <a:rPr lang="en-US" sz="1500" dirty="0">
+                <a:latin typeface="Calibri" panose="020F0502020204030204" pitchFamily="34" charset="0"/>
+                <a:cs typeface="Calibri" panose="020F0502020204030204" pitchFamily="34" charset="0"/>
+              </a:rPr>
+              <a:t>توانیم بجا اینکه به هر</a:t>
+            </a:r>
+            <a:r>
+              <a:rPr lang="en-US" dirty="0">
                 <a:solidFill>
                   <a:srgbClr val="202122"/>
                 </a:solidFill>
-                <a:latin typeface="IRANSans" panose="020B0506030804020204" pitchFamily="34" charset="-78"/>
-                <a:cs typeface="IRANSans" panose="020B0506030804020204" pitchFamily="34" charset="-78"/>
-              </a:rPr>
-              <a:t>o(n) </a:t>
-            </a:r>
-            <a:r>
-              <a:rPr lang="fa-IR" sz="1500" dirty="0">
+                <a:latin typeface="Calibri" panose="020F0502020204030204" pitchFamily="34" charset="0"/>
+                <a:cs typeface="Calibri" panose="020F0502020204030204" pitchFamily="34" charset="0"/>
+              </a:rPr>
+              <a:t> </a:t>
+            </a:r>
+            <a:r>
+              <a:rPr lang="fa-IR" dirty="0">
                 <a:solidFill>
                   <a:srgbClr val="202122"/>
                 </a:solidFill>
-                <a:latin typeface="IRANSans" panose="020B0506030804020204" pitchFamily="34" charset="-78"/>
-                <a:cs typeface="IRANSans" panose="020B0506030804020204" pitchFamily="34" charset="-78"/>
-              </a:rPr>
-              <a:t> خواهد شد.</a:t>
+                <a:latin typeface="Calibri" panose="020F0502020204030204" pitchFamily="34" charset="0"/>
+                <a:cs typeface="Calibri" panose="020F0502020204030204" pitchFamily="34" charset="0"/>
+              </a:rPr>
+              <a:t>عنصر یک اولویت نسبت دهیم اولویت های خود را محدود کرده و هر کدام را به یک صف جداگانه نسبت دهیم همانند سیستم عامل و جاوا که دارای 10 صف با اولویت مشخص می</a:t>
+            </a:r>
+            <a:r>
+              <a:rPr lang="en-US" dirty="0">
+                <a:solidFill>
+                  <a:srgbClr val="202122"/>
+                </a:solidFill>
+                <a:latin typeface="Calibri" panose="020F0502020204030204" pitchFamily="34" charset="0"/>
+                <a:cs typeface="Calibri" panose="020F0502020204030204" pitchFamily="34" charset="0"/>
+              </a:rPr>
+              <a:t> </a:t>
+            </a:r>
+            <a:r>
+              <a:rPr lang="fa-IR" dirty="0">
+                <a:solidFill>
+                  <a:srgbClr val="202122"/>
+                </a:solidFill>
+                <a:latin typeface="Calibri" panose="020F0502020204030204" pitchFamily="34" charset="0"/>
+                <a:cs typeface="Calibri" panose="020F0502020204030204" pitchFamily="34" charset="0"/>
+              </a:rPr>
+              <a:t>باشد و...</a:t>
             </a:r>
           </a:p>
           <a:p>
             <a:pPr algn="r" rtl="1"/>
             <a:r>
-              <a:rPr lang="fa-IR" sz="1500" dirty="0">
+              <a:rPr lang="fa-IR" dirty="0">
                 <a:solidFill>
                   <a:srgbClr val="202122"/>
                 </a:solidFill>
-                <a:latin typeface="IRANSans" panose="020B0506030804020204" pitchFamily="34" charset="-78"/>
-                <a:cs typeface="IRANSans" panose="020B0506030804020204" pitchFamily="34" charset="-78"/>
-              </a:rPr>
-              <a:t>نکته دیگر در مورد این نوع صف این است که ما میتوانیم بجا اینکه به هر عنصر یک اولویت نسبت دهیم اولویت های خود را محدود کرده و هر کدام را به یک صف جداگانه نسبت دهیم همانند سیستم عامل و جاوا که دارای 10 صف با اولویت مشخص میباشد و...</a:t>
-            </a:r>
-          </a:p>
-          <a:p>
-            <a:pPr algn="r" rtl="1"/>
-            <a:r>
-              <a:rPr lang="fa-IR" sz="1500" dirty="0">
+                <a:latin typeface="Calibri" panose="020F0502020204030204" pitchFamily="34" charset="0"/>
+                <a:cs typeface="Calibri" panose="020F0502020204030204" pitchFamily="34" charset="0"/>
+              </a:rPr>
+              <a:t> همچنین خوب است بدانیم که اگر بخواهیم برای پیاده سازی از آرایه استفاده کنیم بهینه ترین روش استفاده از ساختمان داده </a:t>
+            </a:r>
+            <a:r>
+              <a:rPr lang="fa-IR" dirty="0" err="1">
                 <a:solidFill>
                   <a:srgbClr val="202122"/>
                 </a:solidFill>
-                <a:latin typeface="IRANSans" panose="020B0506030804020204" pitchFamily="34" charset="-78"/>
-                <a:cs typeface="IRANSans" panose="020B0506030804020204" pitchFamily="34" charset="-78"/>
-              </a:rPr>
-              <a:t> همچنین خوب است بدانیم که اگر بخواهیم برای پیاده سازی از ارایه استفاده کنیم بهینه ترین روش استفاده از ساختمان داده </a:t>
-            </a:r>
-            <a:r>
-              <a:rPr lang="fa-IR" sz="1500" dirty="0" err="1">
+                <a:latin typeface="Calibri" panose="020F0502020204030204" pitchFamily="34" charset="0"/>
+                <a:cs typeface="Calibri" panose="020F0502020204030204" pitchFamily="34" charset="0"/>
+              </a:rPr>
+              <a:t>هیپ</a:t>
+            </a:r>
+            <a:r>
+              <a:rPr lang="en-US" dirty="0">
                 <a:solidFill>
                   <a:srgbClr val="202122"/>
                 </a:solidFill>
-                <a:latin typeface="IRANSans" panose="020B0506030804020204" pitchFamily="34" charset="-78"/>
-                <a:cs typeface="IRANSans" panose="020B0506030804020204" pitchFamily="34" charset="-78"/>
-              </a:rPr>
-              <a:t>هیپ</a:t>
-            </a:r>
-            <a:r>
-              <a:rPr lang="fa-IR" sz="1500" dirty="0">
+                <a:latin typeface="Calibri" panose="020F0502020204030204" pitchFamily="34" charset="0"/>
+                <a:cs typeface="Calibri" panose="020F0502020204030204" pitchFamily="34" charset="0"/>
+              </a:rPr>
+              <a:t>(Heap)</a:t>
+            </a:r>
+            <a:r>
+              <a:rPr lang="fa-IR" dirty="0">
                 <a:solidFill>
                   <a:srgbClr val="202122"/>
                 </a:solidFill>
-                <a:latin typeface="IRANSans" panose="020B0506030804020204" pitchFamily="34" charset="-78"/>
-                <a:cs typeface="IRANSans" panose="020B0506030804020204" pitchFamily="34" charset="-78"/>
-              </a:rPr>
-              <a:t> میباشد.</a:t>
+                <a:latin typeface="Calibri" panose="020F0502020204030204" pitchFamily="34" charset="0"/>
+                <a:cs typeface="Calibri" panose="020F0502020204030204" pitchFamily="34" charset="0"/>
+              </a:rPr>
+              <a:t> می باشد.</a:t>
             </a:r>
           </a:p>
         </p:txBody>
@@ -12532,14 +12621,14 @@
           <a:p>
             <a:r>
               <a:rPr lang="fa-IR" dirty="0">
-                <a:latin typeface="IRANSans" panose="020B0506030804020204" pitchFamily="34" charset="-78"/>
-                <a:cs typeface="IRANSans" panose="020B0506030804020204" pitchFamily="34" charset="-78"/>
+                <a:latin typeface="Calibri" panose="020F0502020204030204" pitchFamily="34" charset="0"/>
+                <a:cs typeface="Calibri" panose="020F0502020204030204" pitchFamily="34" charset="0"/>
               </a:rPr>
               <a:t>امید رحیمی</a:t>
             </a:r>
             <a:endParaRPr lang="en-US" dirty="0">
-              <a:latin typeface="IRANSans" panose="020B0506030804020204" pitchFamily="34" charset="-78"/>
-              <a:cs typeface="IRANSans" panose="020B0506030804020204" pitchFamily="34" charset="-78"/>
+              <a:latin typeface="Calibri" panose="020F0502020204030204" pitchFamily="34" charset="0"/>
+              <a:cs typeface="Calibri" panose="020F0502020204030204" pitchFamily="34" charset="0"/>
             </a:endParaRPr>
           </a:p>
         </p:txBody>
@@ -12573,14 +12662,15 @@
             <a:r>
               <a:rPr lang="fa-IR" sz="1800" dirty="0">
                 <a:effectLst/>
+                <a:latin typeface="Calibri" panose="020F0502020204030204" pitchFamily="34" charset="0"/>
                 <a:ea typeface="Calibri" panose="020F0502020204030204" pitchFamily="34" charset="0"/>
-                <a:cs typeface="IRANSans" panose="020B0506030804020204" pitchFamily="34" charset="-78"/>
+                <a:cs typeface="Calibri" panose="020F0502020204030204" pitchFamily="34" charset="0"/>
               </a:rPr>
               <a:t>ساخت مستندات</a:t>
             </a:r>
             <a:endParaRPr lang="en-US" dirty="0">
-              <a:latin typeface="IRANSans" panose="020B0506030804020204" pitchFamily="34" charset="-78"/>
-              <a:cs typeface="IRANSans" panose="020B0506030804020204" pitchFamily="34" charset="-78"/>
+              <a:latin typeface="Calibri" panose="020F0502020204030204" pitchFamily="34" charset="0"/>
+              <a:cs typeface="Calibri" panose="020F0502020204030204" pitchFamily="34" charset="0"/>
             </a:endParaRPr>
           </a:p>
         </p:txBody>
@@ -12613,14 +12703,14 @@
           <a:p>
             <a:r>
               <a:rPr lang="fa-IR" dirty="0">
-                <a:latin typeface="IRANSans" panose="020B0506030804020204" pitchFamily="34" charset="-78"/>
-                <a:cs typeface="IRANSans" panose="020B0506030804020204" pitchFamily="34" charset="-78"/>
+                <a:latin typeface="Calibri" panose="020F0502020204030204" pitchFamily="34" charset="0"/>
+                <a:cs typeface="Calibri" panose="020F0502020204030204" pitchFamily="34" charset="0"/>
               </a:rPr>
               <a:t>علی افروزی</a:t>
             </a:r>
             <a:endParaRPr lang="en-US" dirty="0">
-              <a:latin typeface="IRANSans" panose="020B0506030804020204" pitchFamily="34" charset="-78"/>
-              <a:cs typeface="IRANSans" panose="020B0506030804020204" pitchFamily="34" charset="-78"/>
+              <a:latin typeface="Calibri" panose="020F0502020204030204" pitchFamily="34" charset="0"/>
+              <a:cs typeface="Calibri" panose="020F0502020204030204" pitchFamily="34" charset="0"/>
             </a:endParaRPr>
           </a:p>
         </p:txBody>
@@ -12654,14 +12744,15 @@
             <a:r>
               <a:rPr lang="fa-IR" sz="1800" dirty="0">
                 <a:effectLst/>
+                <a:latin typeface="Calibri" panose="020F0502020204030204" pitchFamily="34" charset="0"/>
                 <a:ea typeface="Calibri" panose="020F0502020204030204" pitchFamily="34" charset="0"/>
-                <a:cs typeface="IRANSans" panose="020B0506030804020204" pitchFamily="34" charset="-78"/>
+                <a:cs typeface="Calibri" panose="020F0502020204030204" pitchFamily="34" charset="0"/>
               </a:rPr>
               <a:t>ساخت مستندات</a:t>
             </a:r>
             <a:endParaRPr lang="en-US" dirty="0">
-              <a:latin typeface="IRANSans" panose="020B0506030804020204" pitchFamily="34" charset="-78"/>
-              <a:cs typeface="IRANSans" panose="020B0506030804020204" pitchFamily="34" charset="-78"/>
+              <a:latin typeface="Calibri" panose="020F0502020204030204" pitchFamily="34" charset="0"/>
+              <a:cs typeface="Calibri" panose="020F0502020204030204" pitchFamily="34" charset="0"/>
             </a:endParaRPr>
           </a:p>
         </p:txBody>
@@ -12694,14 +12785,14 @@
           <a:p>
             <a:r>
               <a:rPr lang="fa-IR" dirty="0">
-                <a:latin typeface="IRANSans" panose="020B0506030804020204" pitchFamily="34" charset="-78"/>
-                <a:cs typeface="IRANSans" panose="020B0506030804020204" pitchFamily="34" charset="-78"/>
+                <a:latin typeface="Calibri" panose="020F0502020204030204" pitchFamily="34" charset="0"/>
+                <a:cs typeface="Calibri" panose="020F0502020204030204" pitchFamily="34" charset="0"/>
               </a:rPr>
               <a:t>سید سعید حیدری</a:t>
             </a:r>
             <a:endParaRPr lang="en-US" dirty="0">
-              <a:latin typeface="IRANSans" panose="020B0506030804020204" pitchFamily="34" charset="-78"/>
-              <a:cs typeface="IRANSans" panose="020B0506030804020204" pitchFamily="34" charset="-78"/>
+              <a:latin typeface="Calibri" panose="020F0502020204030204" pitchFamily="34" charset="0"/>
+              <a:cs typeface="Calibri" panose="020F0502020204030204" pitchFamily="34" charset="0"/>
             </a:endParaRPr>
           </a:p>
         </p:txBody>
@@ -12735,14 +12826,15 @@
             <a:r>
               <a:rPr lang="fa-IR" sz="1800" dirty="0">
                 <a:effectLst/>
+                <a:latin typeface="Calibri" panose="020F0502020204030204" pitchFamily="34" charset="0"/>
                 <a:ea typeface="Calibri" panose="020F0502020204030204" pitchFamily="34" charset="0"/>
-                <a:cs typeface="IRANSans" panose="020B0506030804020204" pitchFamily="34" charset="-78"/>
-              </a:rPr>
-              <a:t>بازنگری و دیباگینگ کد</a:t>
+                <a:cs typeface="Calibri" panose="020F0502020204030204" pitchFamily="34" charset="0"/>
+              </a:rPr>
+              <a:t>بازنگری</a:t>
             </a:r>
             <a:endParaRPr lang="en-US" dirty="0">
-              <a:latin typeface="IRANSans" panose="020B0506030804020204" pitchFamily="34" charset="-78"/>
-              <a:cs typeface="IRANSans" panose="020B0506030804020204" pitchFamily="34" charset="-78"/>
+              <a:latin typeface="Calibri" panose="020F0502020204030204" pitchFamily="34" charset="0"/>
+              <a:cs typeface="Calibri" panose="020F0502020204030204" pitchFamily="34" charset="0"/>
             </a:endParaRPr>
           </a:p>
         </p:txBody>
@@ -12775,14 +12867,14 @@
           <a:p>
             <a:r>
               <a:rPr lang="fa-IR" dirty="0">
-                <a:latin typeface="IRANSans" panose="020B0506030804020204" pitchFamily="34" charset="-78"/>
-                <a:cs typeface="IRANSans" panose="020B0506030804020204" pitchFamily="34" charset="-78"/>
+                <a:latin typeface="Calibri" panose="020F0502020204030204" pitchFamily="34" charset="0"/>
+                <a:cs typeface="Calibri" panose="020F0502020204030204" pitchFamily="34" charset="0"/>
               </a:rPr>
               <a:t>مصطفی بینش</a:t>
             </a:r>
             <a:endParaRPr lang="en-US" dirty="0">
-              <a:latin typeface="IRANSans" panose="020B0506030804020204" pitchFamily="34" charset="-78"/>
-              <a:cs typeface="IRANSans" panose="020B0506030804020204" pitchFamily="34" charset="-78"/>
+              <a:latin typeface="Calibri" panose="020F0502020204030204" pitchFamily="34" charset="0"/>
+              <a:cs typeface="Calibri" panose="020F0502020204030204" pitchFamily="34" charset="0"/>
             </a:endParaRPr>
           </a:p>
         </p:txBody>
@@ -12816,14 +12908,15 @@
             <a:r>
               <a:rPr lang="fa-IR" sz="1800" dirty="0">
                 <a:effectLst/>
+                <a:latin typeface="Calibri" panose="020F0502020204030204" pitchFamily="34" charset="0"/>
                 <a:ea typeface="Calibri" panose="020F0502020204030204" pitchFamily="34" charset="0"/>
-                <a:cs typeface="IRANSans" panose="020B0506030804020204" pitchFamily="34" charset="-78"/>
+                <a:cs typeface="Calibri" panose="020F0502020204030204" pitchFamily="34" charset="0"/>
               </a:rPr>
               <a:t>برنامه نویسی پروژه</a:t>
             </a:r>
             <a:endParaRPr lang="en-US" dirty="0">
-              <a:latin typeface="IRANSans" panose="020B0506030804020204" pitchFamily="34" charset="-78"/>
-              <a:cs typeface="IRANSans" panose="020B0506030804020204" pitchFamily="34" charset="-78"/>
+              <a:latin typeface="Calibri" panose="020F0502020204030204" pitchFamily="34" charset="0"/>
+              <a:cs typeface="Calibri" panose="020F0502020204030204" pitchFamily="34" charset="0"/>
             </a:endParaRPr>
           </a:p>
         </p:txBody>
@@ -12855,11 +12948,17 @@
           <a:lstStyle/>
           <a:p>
             <a:fld id="{8B48EBF6-60E6-462A-9155-5FAF136BCCBC}" type="slidenum">
-              <a:rPr lang="en-US" smtClean="0"/>
+              <a:rPr lang="en-US" smtClean="0">
+                <a:latin typeface="Calibri" panose="020F0502020204030204" pitchFamily="34" charset="0"/>
+                <a:cs typeface="Calibri" panose="020F0502020204030204" pitchFamily="34" charset="0"/>
+              </a:rPr>
               <a:pPr/>
               <a:t>15</a:t>
             </a:fld>
-            <a:endParaRPr lang="en-US" dirty="0"/>
+            <a:endParaRPr lang="en-US" dirty="0">
+              <a:latin typeface="Calibri" panose="020F0502020204030204" pitchFamily="34" charset="0"/>
+              <a:cs typeface="Calibri" panose="020F0502020204030204" pitchFamily="34" charset="0"/>
+            </a:endParaRPr>
           </a:p>
         </p:txBody>
       </p:sp>
@@ -13057,14 +13156,14 @@
           <a:p>
             <a:r>
               <a:rPr lang="fa-IR" dirty="0">
-                <a:latin typeface="IRANSans" panose="020B0506030804020204" pitchFamily="34" charset="-78"/>
-                <a:cs typeface="IRANSans" panose="020B0506030804020204" pitchFamily="34" charset="-78"/>
+                <a:latin typeface="Calibri" panose="020F0502020204030204" pitchFamily="34" charset="0"/>
+                <a:cs typeface="Calibri" panose="020F0502020204030204" pitchFamily="34" charset="0"/>
               </a:rPr>
               <a:t>رضا زنگنه ثانی</a:t>
             </a:r>
             <a:endParaRPr lang="en-US" dirty="0">
-              <a:latin typeface="IRANSans" panose="020B0506030804020204" pitchFamily="34" charset="-78"/>
-              <a:cs typeface="IRANSans" panose="020B0506030804020204" pitchFamily="34" charset="-78"/>
+              <a:latin typeface="Calibri" panose="020F0502020204030204" pitchFamily="34" charset="0"/>
+              <a:cs typeface="Calibri" panose="020F0502020204030204" pitchFamily="34" charset="0"/>
             </a:endParaRPr>
           </a:p>
         </p:txBody>
@@ -13264,14 +13363,15 @@
             <a:r>
               <a:rPr lang="fa-IR" sz="1800" dirty="0">
                 <a:effectLst/>
+                <a:latin typeface="Calibri" panose="020F0502020204030204" pitchFamily="34" charset="0"/>
                 <a:ea typeface="Calibri" panose="020F0502020204030204" pitchFamily="34" charset="0"/>
-                <a:cs typeface="IRANSans" panose="020B0506030804020204" pitchFamily="34" charset="-78"/>
+                <a:cs typeface="Calibri" panose="020F0502020204030204" pitchFamily="34" charset="0"/>
               </a:rPr>
               <a:t>برنامه نویسی پروژه</a:t>
             </a:r>
             <a:endParaRPr lang="en-US" dirty="0">
-              <a:latin typeface="IRANSans" panose="020B0506030804020204" pitchFamily="34" charset="-78"/>
-              <a:cs typeface="IRANSans" panose="020B0506030804020204" pitchFamily="34" charset="-78"/>
+              <a:latin typeface="Calibri" panose="020F0502020204030204" pitchFamily="34" charset="0"/>
+              <a:cs typeface="Calibri" panose="020F0502020204030204" pitchFamily="34" charset="0"/>
             </a:endParaRPr>
           </a:p>
         </p:txBody>
@@ -13476,8 +13576,8 @@
                     <a:lumOff val="60000"/>
                   </a:schemeClr>
                 </a:solidFill>
-                <a:latin typeface="IRANSans" panose="020B0506030804020204" pitchFamily="34" charset="-78"/>
-                <a:cs typeface="IRANSans" panose="020B0506030804020204" pitchFamily="34" charset="-78"/>
+                <a:latin typeface="Calibri" panose="020F0502020204030204" pitchFamily="34" charset="0"/>
+                <a:cs typeface="Calibri" panose="020F0502020204030204" pitchFamily="34" charset="0"/>
               </a:rPr>
               <a:t>اعضای گروه</a:t>
             </a:r>
@@ -13488,8 +13588,83 @@
                   <a:lumOff val="60000"/>
                 </a:schemeClr>
               </a:solidFill>
-              <a:latin typeface="IRANSans" panose="020B0506030804020204" pitchFamily="34" charset="-78"/>
-              <a:cs typeface="IRANSans" panose="020B0506030804020204" pitchFamily="34" charset="-78"/>
+              <a:latin typeface="Calibri" panose="020F0502020204030204" pitchFamily="34" charset="0"/>
+              <a:cs typeface="Calibri" panose="020F0502020204030204" pitchFamily="34" charset="0"/>
+            </a:endParaRPr>
+          </a:p>
+        </p:txBody>
+      </p:sp>
+      <p:sp>
+        <p:nvSpPr>
+          <p:cNvPr id="2" name="TextBox 1">
+            <a:extLst>
+              <a:ext uri="{FF2B5EF4-FFF2-40B4-BE49-F238E27FC236}">
+                <a16:creationId xmlns:a16="http://schemas.microsoft.com/office/drawing/2014/main" id="{4CC88DFB-6086-44EF-9E7B-9E0765355CED}"/>
+              </a:ext>
+            </a:extLst>
+          </p:cNvPr>
+          <p:cNvSpPr txBox="1"/>
+          <p:nvPr/>
+        </p:nvSpPr>
+        <p:spPr>
+          <a:xfrm>
+            <a:off x="146817" y="6449306"/>
+            <a:ext cx="5977727" cy="369332"/>
+          </a:xfrm>
+          <a:prstGeom prst="rect">
+            <a:avLst/>
+          </a:prstGeom>
+          <a:noFill/>
+        </p:spPr>
+        <p:txBody>
+          <a:bodyPr wrap="none" rtlCol="1">
+            <a:spAutoFit/>
+          </a:bodyPr>
+          <a:lstStyle/>
+          <a:p>
+            <a:r>
+              <a:rPr lang="en-US" i="1" dirty="0">
+                <a:effectLst/>
+                <a:latin typeface="Calibri" panose="020F0502020204030204" pitchFamily="34" charset="0"/>
+                <a:cs typeface="Calibri" panose="020F0502020204030204" pitchFamily="34" charset="0"/>
+              </a:rPr>
+              <a:t>Git hub</a:t>
+            </a:r>
+            <a:r>
+              <a:rPr lang="en-US" dirty="0">
+                <a:effectLst/>
+                <a:latin typeface="Calibri" panose="020F0502020204030204" pitchFamily="34" charset="0"/>
+                <a:cs typeface="Calibri" panose="020F0502020204030204" pitchFamily="34" charset="0"/>
+              </a:rPr>
+              <a:t> </a:t>
+            </a:r>
+            <a:r>
+              <a:rPr lang="en-US" i="1" dirty="0">
+                <a:effectLst/>
+                <a:latin typeface="Calibri" panose="020F0502020204030204" pitchFamily="34" charset="0"/>
+                <a:cs typeface="Calibri" panose="020F0502020204030204" pitchFamily="34" charset="0"/>
+              </a:rPr>
+              <a:t>link</a:t>
+            </a:r>
+            <a:r>
+              <a:rPr lang="en-US" dirty="0">
+                <a:effectLst/>
+                <a:latin typeface="Calibri" panose="020F0502020204030204" pitchFamily="34" charset="0"/>
+                <a:cs typeface="Calibri" panose="020F0502020204030204" pitchFamily="34" charset="0"/>
+              </a:rPr>
+              <a:t> </a:t>
+            </a:r>
+            <a:r>
+              <a:rPr lang="en-US" i="1" dirty="0">
+                <a:effectLst/>
+                <a:latin typeface="Calibri" panose="020F0502020204030204" pitchFamily="34" charset="0"/>
+                <a:cs typeface="Calibri" panose="020F0502020204030204" pitchFamily="34" charset="0"/>
+              </a:rPr>
+              <a:t>https://github.com/rezasnai/Implemention-queue</a:t>
+            </a:r>
+            <a:endParaRPr lang="fa-IR" dirty="0">
+              <a:latin typeface="Calibri" panose="020F0502020204030204" pitchFamily="34" charset="0"/>
+              <a:cs typeface="Calibri" panose="020F0502020204030204" pitchFamily="34" charset="0"/>
             </a:endParaRPr>
           </a:p>
         </p:txBody>
@@ -13552,7 +13727,10 @@
           <a:lstStyle/>
           <a:p>
             <a:r>
-              <a:rPr lang="en-US" dirty="0"/>
+              <a:rPr lang="en-US" dirty="0">
+                <a:latin typeface="Calibri" panose="020F0502020204030204" pitchFamily="34" charset="0"/>
+                <a:cs typeface="Calibri" panose="020F0502020204030204" pitchFamily="34" charset="0"/>
+              </a:rPr>
               <a:t>Sample Footer Text</a:t>
             </a:r>
           </a:p>
@@ -13585,11 +13763,17 @@
           <a:lstStyle/>
           <a:p>
             <a:fld id="{8B48EBF6-60E6-462A-9155-5FAF136BCCBC}" type="slidenum">
-              <a:rPr lang="en-US" smtClean="0"/>
+              <a:rPr lang="en-US" smtClean="0">
+                <a:latin typeface="Calibri" panose="020F0502020204030204" pitchFamily="34" charset="0"/>
+                <a:cs typeface="Calibri" panose="020F0502020204030204" pitchFamily="34" charset="0"/>
+              </a:rPr>
               <a:pPr/>
               <a:t>2</a:t>
             </a:fld>
-            <a:endParaRPr lang="en-US" dirty="0"/>
+            <a:endParaRPr lang="en-US" dirty="0">
+              <a:latin typeface="Calibri" panose="020F0502020204030204" pitchFamily="34" charset="0"/>
+              <a:cs typeface="Calibri" panose="020F0502020204030204" pitchFamily="34" charset="0"/>
+            </a:endParaRPr>
           </a:p>
         </p:txBody>
       </p:sp>
@@ -13623,13 +13807,13 @@
           <a:p>
             <a:pPr algn="ctr" rtl="1"/>
             <a:r>
-              <a:rPr lang="fa-IR" sz="2800" b="0" i="0" dirty="0">
+              <a:rPr lang="fa-IR" sz="2800" b="1" i="0" dirty="0">
                 <a:solidFill>
                   <a:srgbClr val="EB5A64"/>
                 </a:solidFill>
                 <a:effectLst/>
-                <a:latin typeface="IRANSans" panose="020B0506030804020204" pitchFamily="34" charset="-78"/>
-                <a:cs typeface="IRANSans" panose="020B0506030804020204" pitchFamily="34" charset="-78"/>
+                <a:latin typeface="Calibri" panose="020F0502020204030204" pitchFamily="34" charset="0"/>
+                <a:cs typeface="Calibri" panose="020F0502020204030204" pitchFamily="34" charset="0"/>
               </a:rPr>
               <a:t>لیست پیوندی چیست؟</a:t>
             </a:r>
@@ -13652,8 +13836,8 @@
         </p:nvSpPr>
         <p:spPr>
           <a:xfrm>
-            <a:off x="2168435" y="1875390"/>
-            <a:ext cx="7985760" cy="2812869"/>
+            <a:off x="2103120" y="1590164"/>
+            <a:ext cx="7985760" cy="4307296"/>
           </a:xfrm>
           <a:prstGeom prst="rect">
             <a:avLst/>
@@ -13830,9 +14014,12 @@
           <a:p>
             <a:pPr algn="r" rtl="1"/>
             <a:r>
-              <a:rPr lang="fa-IR" sz="1500" dirty="0">
-                <a:latin typeface="IRANSans" panose="020B0506030804020204" pitchFamily="34" charset="-78"/>
-                <a:cs typeface="IRANSans" panose="020B0506030804020204" pitchFamily="34" charset="-78"/>
+              <a:rPr lang="fa-IR" sz="2000" b="1" dirty="0">
+                <a:solidFill>
+                  <a:srgbClr val="7030A0"/>
+                </a:solidFill>
+                <a:latin typeface="Calibri" panose="020F0502020204030204" pitchFamily="34" charset="0"/>
+                <a:cs typeface="Calibri" panose="020F0502020204030204" pitchFamily="34" charset="0"/>
               </a:rPr>
               <a:t>ساختاری شامل دنباله‌ای از عناصر است که هر عنصر دارای اشاره‌گری به عنصر بعدی در دنباله است. فهرست پیوندی از جملهٔ ساده‌ترین و رایج‌ترین ساختمان داده ها است و در پیاده سازی پشته و صف از آن استفاده می شود.</a:t>
             </a:r>
@@ -13840,37 +14027,15 @@
           <a:p>
             <a:pPr algn="r" rtl="1"/>
             <a:r>
-              <a:rPr lang="fa-IR" sz="1500" b="0" i="0" dirty="0">
+              <a:rPr lang="fa-IR" b="0" i="0" dirty="0">
                 <a:solidFill>
                   <a:srgbClr val="202122"/>
                 </a:solidFill>
                 <a:effectLst/>
-                <a:latin typeface="IRANSans" panose="020B0506030804020204" pitchFamily="34" charset="-78"/>
-                <a:cs typeface="IRANSans" panose="020B0506030804020204" pitchFamily="34" charset="-78"/>
-              </a:rPr>
-              <a:t>مزیت های لیست پیوندی نسبت به  </a:t>
-            </a:r>
-            <a:r>
-              <a:rPr lang="fa-IR" sz="1500" b="0" i="0" dirty="0" err="1">
-                <a:solidFill>
-                  <a:srgbClr val="202122"/>
-                </a:solidFill>
-                <a:effectLst/>
-                <a:latin typeface="IRANSans" panose="020B0506030804020204" pitchFamily="34" charset="-78"/>
-                <a:cs typeface="IRANSans" panose="020B0506030804020204" pitchFamily="34" charset="-78"/>
-              </a:rPr>
-              <a:t>آراریه</a:t>
-            </a:r>
-            <a:r>
-              <a:rPr lang="fa-IR" sz="1500" b="0" i="0" dirty="0">
-                <a:solidFill>
-                  <a:srgbClr val="202122"/>
-                </a:solidFill>
-                <a:effectLst/>
-                <a:latin typeface="IRANSans" panose="020B0506030804020204" pitchFamily="34" charset="-78"/>
-                <a:cs typeface="IRANSans" panose="020B0506030804020204" pitchFamily="34" charset="-78"/>
-              </a:rPr>
-              <a:t>  :</a:t>
+                <a:latin typeface="Calibri" panose="020F0502020204030204" pitchFamily="34" charset="0"/>
+                <a:cs typeface="Calibri" panose="020F0502020204030204" pitchFamily="34" charset="0"/>
+              </a:rPr>
+              <a:t>مزیت های لیست پیوندی نسبت به  آرایه:</a:t>
             </a:r>
           </a:p>
           <a:p>
@@ -13879,13 +14044,13 @@
               <a:buChar char="-"/>
             </a:pPr>
             <a:r>
-              <a:rPr lang="fa-IR" sz="1500" b="0" i="0" dirty="0">
+              <a:rPr lang="fa-IR" b="0" i="0" dirty="0">
                 <a:solidFill>
                   <a:srgbClr val="202122"/>
                 </a:solidFill>
                 <a:effectLst/>
-                <a:latin typeface="IRANSans" panose="020B0506030804020204" pitchFamily="34" charset="-78"/>
-                <a:cs typeface="IRANSans" panose="020B0506030804020204" pitchFamily="34" charset="-78"/>
+                <a:latin typeface="Calibri" panose="020F0502020204030204" pitchFamily="34" charset="0"/>
+                <a:cs typeface="Calibri" panose="020F0502020204030204" pitchFamily="34" charset="0"/>
               </a:rPr>
               <a:t>فهرست پیوندی نسبت به آرایه‌ ها ترتیب قرار گرفتن داده‌ها در آن با ترتیب قرار گرفتن آن‌ها در حافظه متفاوت است. به همین دلیل فهرست پیوندی دارای این ویژگی است که درج و حذف گره‌ها در هر نقطه‌ ای از فهرست، با تعداد ثابتی از عملیات امکان‌پذیر است. درصورتی که در آرایه ما نیازمند شیفت خواهیم بود.</a:t>
             </a:r>
@@ -13896,13 +14061,13 @@
               <a:buChar char="-"/>
             </a:pPr>
             <a:r>
-              <a:rPr lang="fa-IR" sz="1500" b="0" i="0" dirty="0">
+              <a:rPr lang="fa-IR" b="0" i="0" dirty="0">
                 <a:solidFill>
                   <a:srgbClr val="202122"/>
                 </a:solidFill>
                 <a:effectLst/>
-                <a:latin typeface="IRANSans" panose="020B0506030804020204" pitchFamily="34" charset="-78"/>
-                <a:cs typeface="IRANSans" panose="020B0506030804020204" pitchFamily="34" charset="-78"/>
+                <a:latin typeface="Calibri" panose="020F0502020204030204" pitchFamily="34" charset="0"/>
+                <a:cs typeface="Calibri" panose="020F0502020204030204" pitchFamily="34" charset="0"/>
               </a:rPr>
               <a:t>حافظه مورد نیاز برای پیاده سازی لیست بر خلاف ارایه میتواند یک جا نباشد و پراکنده باشد.</a:t>
             </a:r>
@@ -13913,13 +14078,13 @@
               <a:buChar char="-"/>
             </a:pPr>
             <a:r>
-              <a:rPr lang="fa-IR" sz="1500" b="0" i="0" dirty="0">
+              <a:rPr lang="fa-IR" b="0" i="0" dirty="0">
                 <a:solidFill>
                   <a:srgbClr val="202122"/>
                 </a:solidFill>
                 <a:effectLst/>
-                <a:latin typeface="IRANSans" panose="020B0506030804020204" pitchFamily="34" charset="-78"/>
-                <a:cs typeface="IRANSans" panose="020B0506030804020204" pitchFamily="34" charset="-78"/>
+                <a:latin typeface="Calibri" panose="020F0502020204030204" pitchFamily="34" charset="0"/>
+                <a:cs typeface="Calibri" panose="020F0502020204030204" pitchFamily="34" charset="0"/>
               </a:rPr>
               <a:t>سایز لیست پیوندی میتواند تغییر کند.</a:t>
             </a:r>
@@ -13929,13 +14094,13 @@
               <a:buFontTx/>
               <a:buChar char="-"/>
             </a:pPr>
-            <a:endParaRPr lang="fa-IR" sz="1500" b="0" i="0" dirty="0">
+            <a:endParaRPr lang="fa-IR" b="0" i="0" dirty="0">
               <a:solidFill>
                 <a:srgbClr val="202122"/>
               </a:solidFill>
               <a:effectLst/>
-              <a:latin typeface="IRANSans" panose="020B0506030804020204" pitchFamily="34" charset="-78"/>
-              <a:cs typeface="IRANSans" panose="020B0506030804020204" pitchFamily="34" charset="-78"/>
+              <a:latin typeface="Calibri" panose="020F0502020204030204" pitchFamily="34" charset="0"/>
+              <a:cs typeface="Calibri" panose="020F0502020204030204" pitchFamily="34" charset="0"/>
             </a:endParaRPr>
           </a:p>
         </p:txBody>
@@ -13998,7 +14163,10 @@
           <a:lstStyle/>
           <a:p>
             <a:r>
-              <a:rPr lang="en-US" dirty="0"/>
+              <a:rPr lang="en-US" dirty="0">
+                <a:latin typeface="Calibri" panose="020F0502020204030204" pitchFamily="34" charset="0"/>
+                <a:cs typeface="Calibri" panose="020F0502020204030204" pitchFamily="34" charset="0"/>
+              </a:rPr>
               <a:t>Sample Footer Text</a:t>
             </a:r>
           </a:p>
@@ -14031,11 +14199,17 @@
           <a:lstStyle/>
           <a:p>
             <a:fld id="{8B48EBF6-60E6-462A-9155-5FAF136BCCBC}" type="slidenum">
-              <a:rPr lang="en-US" smtClean="0"/>
+              <a:rPr lang="en-US" smtClean="0">
+                <a:latin typeface="Calibri" panose="020F0502020204030204" pitchFamily="34" charset="0"/>
+                <a:cs typeface="Calibri" panose="020F0502020204030204" pitchFamily="34" charset="0"/>
+              </a:rPr>
               <a:pPr/>
               <a:t>3</a:t>
             </a:fld>
-            <a:endParaRPr lang="en-US" dirty="0"/>
+            <a:endParaRPr lang="en-US" dirty="0">
+              <a:latin typeface="Calibri" panose="020F0502020204030204" pitchFamily="34" charset="0"/>
+              <a:cs typeface="Calibri" panose="020F0502020204030204" pitchFamily="34" charset="0"/>
+            </a:endParaRPr>
           </a:p>
         </p:txBody>
       </p:sp>
@@ -14069,13 +14243,13 @@
           <a:p>
             <a:pPr algn="ctr" rtl="1"/>
             <a:r>
-              <a:rPr lang="fa-IR" sz="2800" b="0" i="0" dirty="0">
+              <a:rPr lang="fa-IR" sz="2800" b="1" i="0" dirty="0">
                 <a:solidFill>
                   <a:srgbClr val="EB5A64"/>
                 </a:solidFill>
                 <a:effectLst/>
-                <a:latin typeface="IRANSans" panose="020B0506030804020204" pitchFamily="34" charset="-78"/>
-                <a:cs typeface="IRANSans" panose="020B0506030804020204" pitchFamily="34" charset="-78"/>
+                <a:latin typeface="Calibri" panose="020F0502020204030204" pitchFamily="34" charset="0"/>
+                <a:cs typeface="Calibri" panose="020F0502020204030204" pitchFamily="34" charset="0"/>
               </a:rPr>
               <a:t>کاربرد صف ها:</a:t>
             </a:r>
@@ -14098,8 +14272,8 @@
         </p:nvSpPr>
         <p:spPr>
           <a:xfrm>
-            <a:off x="2168435" y="1875390"/>
-            <a:ext cx="7985760" cy="2812869"/>
+            <a:off x="2004969" y="1875390"/>
+            <a:ext cx="8149226" cy="2812869"/>
           </a:xfrm>
           <a:prstGeom prst="rect">
             <a:avLst/>
@@ -14276,166 +14450,187 @@
           <a:p>
             <a:pPr algn="just" rtl="1"/>
             <a:r>
-              <a:rPr lang="fa-IR" sz="1800" b="0" i="0" dirty="0">
+              <a:rPr lang="fa-IR" sz="2000" b="0" i="0" dirty="0">
                 <a:solidFill>
                   <a:srgbClr val="000000"/>
                 </a:solidFill>
                 <a:effectLst/>
-                <a:latin typeface="Tahoma" panose="020B0604030504040204" pitchFamily="34" charset="0"/>
+                <a:latin typeface="Calibri" panose="020F0502020204030204" pitchFamily="34" charset="0"/>
+                <a:cs typeface="Calibri" panose="020F0502020204030204" pitchFamily="34" charset="0"/>
               </a:rPr>
               <a:t>صف معمولا در </a:t>
             </a:r>
             <a:r>
-              <a:rPr lang="fa-IR" sz="1800" b="0" i="0" dirty="0" err="1">
+              <a:rPr lang="fa-IR" sz="2000" b="0" i="0" dirty="0" err="1">
                 <a:solidFill>
                   <a:srgbClr val="000000"/>
                 </a:solidFill>
                 <a:effectLst/>
-                <a:latin typeface="Tahoma" panose="020B0604030504040204" pitchFamily="34" charset="0"/>
+                <a:latin typeface="Calibri" panose="020F0502020204030204" pitchFamily="34" charset="0"/>
+                <a:cs typeface="Calibri" panose="020F0502020204030204" pitchFamily="34" charset="0"/>
               </a:rPr>
               <a:t>سيستم</a:t>
             </a:r>
             <a:r>
-              <a:rPr lang="fa-IR" sz="1800" b="0" i="0" dirty="0">
+              <a:rPr lang="fa-IR" sz="2000" b="0" i="0" dirty="0">
                 <a:solidFill>
                   <a:srgbClr val="000000"/>
                 </a:solidFill>
                 <a:effectLst/>
-                <a:latin typeface="Tahoma" panose="020B0604030504040204" pitchFamily="34" charset="0"/>
+                <a:latin typeface="Calibri" panose="020F0502020204030204" pitchFamily="34" charset="0"/>
+                <a:cs typeface="Calibri" panose="020F0502020204030204" pitchFamily="34" charset="0"/>
               </a:rPr>
               <a:t> های عامل و نرم </a:t>
             </a:r>
             <a:r>
-              <a:rPr lang="fa-IR" sz="1800" b="0" i="0" dirty="0" err="1">
+              <a:rPr lang="fa-IR" sz="2000" b="0" i="0" dirty="0" err="1">
                 <a:solidFill>
                   <a:srgbClr val="000000"/>
                 </a:solidFill>
                 <a:effectLst/>
-                <a:latin typeface="Tahoma" panose="020B0604030504040204" pitchFamily="34" charset="0"/>
+                <a:latin typeface="Calibri" panose="020F0502020204030204" pitchFamily="34" charset="0"/>
+                <a:cs typeface="Calibri" panose="020F0502020204030204" pitchFamily="34" charset="0"/>
               </a:rPr>
               <a:t>افزارهايی</a:t>
             </a:r>
             <a:r>
-              <a:rPr lang="fa-IR" sz="1800" b="0" i="0" dirty="0">
+              <a:rPr lang="fa-IR" sz="2000" b="0" i="0" dirty="0">
                 <a:solidFill>
                   <a:srgbClr val="000000"/>
                 </a:solidFill>
                 <a:effectLst/>
-                <a:latin typeface="Tahoma" panose="020B0604030504040204" pitchFamily="34" charset="0"/>
-              </a:rPr>
-              <a:t> که صف انتظار برای دسترسی به منبعی را برقرار می کنند استفاده می شوند. </a:t>
-            </a:r>
-            <a:r>
-              <a:rPr lang="fa-IR" sz="1800" b="0" i="0" dirty="0" err="1">
+                <a:latin typeface="Calibri" panose="020F0502020204030204" pitchFamily="34" charset="0"/>
+                <a:cs typeface="Calibri" panose="020F0502020204030204" pitchFamily="34" charset="0"/>
+              </a:rPr>
+              <a:t> که صف انتظار برای دسترسی به منبعی را برقرار می کنند استفاده می شوند.</a:t>
+            </a:r>
+          </a:p>
+          <a:p>
+            <a:pPr algn="just" rtl="1"/>
+            <a:r>
+              <a:rPr lang="fa-IR" sz="2000" b="0" i="0" dirty="0" err="1">
                 <a:solidFill>
                   <a:srgbClr val="000000"/>
                 </a:solidFill>
                 <a:effectLst/>
-                <a:latin typeface="Tahoma" panose="020B0604030504040204" pitchFamily="34" charset="0"/>
+                <a:latin typeface="Calibri" panose="020F0502020204030204" pitchFamily="34" charset="0"/>
+                <a:cs typeface="Calibri" panose="020F0502020204030204" pitchFamily="34" charset="0"/>
               </a:rPr>
               <a:t>سيستم</a:t>
             </a:r>
             <a:r>
-              <a:rPr lang="fa-IR" sz="1800" b="0" i="0" dirty="0">
+              <a:rPr lang="fa-IR" sz="2000" b="0" i="0" dirty="0">
                 <a:solidFill>
                   <a:srgbClr val="000000"/>
                 </a:solidFill>
                 <a:effectLst/>
-                <a:latin typeface="Tahoma" panose="020B0604030504040204" pitchFamily="34" charset="0"/>
+                <a:latin typeface="Calibri" panose="020F0502020204030204" pitchFamily="34" charset="0"/>
+                <a:cs typeface="Calibri" panose="020F0502020204030204" pitchFamily="34" charset="0"/>
               </a:rPr>
               <a:t> عامل ممکن است صفی از </a:t>
             </a:r>
             <a:r>
-              <a:rPr lang="fa-IR" sz="1800" b="0" i="0" dirty="0" err="1">
+              <a:rPr lang="fa-IR" sz="2000" b="0" i="0" dirty="0" err="1">
                 <a:solidFill>
                   <a:srgbClr val="000000"/>
                 </a:solidFill>
                 <a:effectLst/>
-                <a:latin typeface="Tahoma" panose="020B0604030504040204" pitchFamily="34" charset="0"/>
+                <a:latin typeface="Calibri" panose="020F0502020204030204" pitchFamily="34" charset="0"/>
+                <a:cs typeface="Calibri" panose="020F0502020204030204" pitchFamily="34" charset="0"/>
               </a:rPr>
               <a:t>پروسس</a:t>
             </a:r>
             <a:r>
-              <a:rPr lang="fa-IR" sz="1800" b="0" i="0" dirty="0">
+              <a:rPr lang="fa-IR" sz="2000" b="0" i="0" dirty="0">
                 <a:solidFill>
                   <a:srgbClr val="000000"/>
                 </a:solidFill>
                 <a:effectLst/>
-                <a:latin typeface="Tahoma" panose="020B0604030504040204" pitchFamily="34" charset="0"/>
+                <a:latin typeface="Calibri" panose="020F0502020204030204" pitchFamily="34" charset="0"/>
+                <a:cs typeface="Calibri" panose="020F0502020204030204" pitchFamily="34" charset="0"/>
               </a:rPr>
               <a:t> </a:t>
             </a:r>
             <a:r>
-              <a:rPr lang="fa-IR" sz="1800" b="0" i="0" dirty="0" err="1">
+              <a:rPr lang="fa-IR" sz="2000" b="0" i="0" dirty="0" err="1">
                 <a:solidFill>
                   <a:srgbClr val="000000"/>
                 </a:solidFill>
                 <a:effectLst/>
-                <a:latin typeface="Tahoma" panose="020B0604030504040204" pitchFamily="34" charset="0"/>
+                <a:latin typeface="Calibri" panose="020F0502020204030204" pitchFamily="34" charset="0"/>
+                <a:cs typeface="Calibri" panose="020F0502020204030204" pitchFamily="34" charset="0"/>
               </a:rPr>
               <a:t>هايی</a:t>
             </a:r>
             <a:r>
-              <a:rPr lang="fa-IR" sz="1800" b="0" i="0" dirty="0">
+              <a:rPr lang="fa-IR" sz="2000" b="0" i="0" dirty="0">
                 <a:solidFill>
                   <a:srgbClr val="000000"/>
                 </a:solidFill>
                 <a:effectLst/>
-                <a:latin typeface="Tahoma" panose="020B0604030504040204" pitchFamily="34" charset="0"/>
-              </a:rPr>
-              <a:t> که منتظر اجرا روی </a:t>
-            </a:r>
-            <a:r>
-              <a:rPr lang="en-US" sz="1800" b="0" i="0" dirty="0">
+                <a:latin typeface="Calibri" panose="020F0502020204030204" pitchFamily="34" charset="0"/>
+                <a:cs typeface="Calibri" panose="020F0502020204030204" pitchFamily="34" charset="0"/>
+              </a:rPr>
+              <a:t> که منتظر اجرا روی</a:t>
+            </a:r>
+            <a:r>
+              <a:rPr lang="en-US" sz="2000" b="0" i="0" dirty="0">
                 <a:solidFill>
                   <a:srgbClr val="000000"/>
                 </a:solidFill>
                 <a:effectLst/>
-                <a:latin typeface="Tahoma" panose="020B0604030504040204" pitchFamily="34" charset="0"/>
-              </a:rPr>
-              <a:t> CPU </a:t>
-            </a:r>
-            <a:r>
-              <a:rPr lang="fa-IR" sz="1800" b="0" i="0" dirty="0">
+                <a:latin typeface="Calibri" panose="020F0502020204030204" pitchFamily="34" charset="0"/>
+                <a:cs typeface="Calibri" panose="020F0502020204030204" pitchFamily="34" charset="0"/>
+              </a:rPr>
+              <a:t> </a:t>
+            </a:r>
+            <a:r>
+              <a:rPr lang="en-US" sz="2000" b="1" i="0" dirty="0">
                 <a:solidFill>
                   <a:srgbClr val="000000"/>
                 </a:solidFill>
                 <a:effectLst/>
-                <a:latin typeface="Tahoma" panose="020B0604030504040204" pitchFamily="34" charset="0"/>
-              </a:rPr>
-              <a:t>هستند </a:t>
-            </a:r>
-            <a:r>
-              <a:rPr lang="fa-IR" sz="1800" b="0" i="0" dirty="0" err="1">
+                <a:latin typeface="Calibri" panose="020F0502020204030204" pitchFamily="34" charset="0"/>
+                <a:cs typeface="Calibri" panose="020F0502020204030204" pitchFamily="34" charset="0"/>
+              </a:rPr>
+              <a:t>CPU</a:t>
+            </a:r>
+            <a:r>
+              <a:rPr lang="en-US" sz="2000" b="0" i="0" dirty="0">
                 <a:solidFill>
                   <a:srgbClr val="000000"/>
                 </a:solidFill>
                 <a:effectLst/>
-                <a:latin typeface="Tahoma" panose="020B0604030504040204" pitchFamily="34" charset="0"/>
-              </a:rPr>
-              <a:t>يا</a:t>
-            </a:r>
-            <a:r>
-              <a:rPr lang="fa-IR" sz="1800" b="0" i="0" dirty="0">
+                <a:latin typeface="Calibri" panose="020F0502020204030204" pitchFamily="34" charset="0"/>
+                <a:cs typeface="Calibri" panose="020F0502020204030204" pitchFamily="34" charset="0"/>
+              </a:rPr>
+              <a:t> </a:t>
+            </a:r>
+            <a:r>
+              <a:rPr lang="fa-IR" sz="2000" b="0" i="0" dirty="0">
                 <a:solidFill>
                   <a:srgbClr val="000000"/>
                 </a:solidFill>
                 <a:effectLst/>
-                <a:latin typeface="Tahoma" panose="020B0604030504040204" pitchFamily="34" charset="0"/>
-              </a:rPr>
-              <a:t> صفی از کارهای که منتظر چاپ هستند را داشته باشد.</a:t>
+                <a:latin typeface="Calibri" panose="020F0502020204030204" pitchFamily="34" charset="0"/>
+                <a:cs typeface="Calibri" panose="020F0502020204030204" pitchFamily="34" charset="0"/>
+              </a:rPr>
+              <a:t>هستند یا صفی از کارهایی که منتظر چاپ هستند را داشته باشد.</a:t>
             </a:r>
           </a:p>
           <a:p>
             <a:br>
-              <a:rPr lang="fa-IR" sz="1600" dirty="0"/>
+              <a:rPr lang="fa-IR" sz="1600" dirty="0">
+                <a:latin typeface="Calibri" panose="020F0502020204030204" pitchFamily="34" charset="0"/>
+                <a:cs typeface="Calibri" panose="020F0502020204030204" pitchFamily="34" charset="0"/>
+              </a:rPr>
             </a:br>
             <a:endParaRPr lang="fa-IR" sz="1500" dirty="0">
               <a:solidFill>
                 <a:srgbClr val="202122"/>
               </a:solidFill>
-              <a:latin typeface="IRANSans" panose="020B0506030804020204" pitchFamily="34" charset="-78"/>
-              <a:cs typeface="IRANSans" panose="020B0506030804020204" pitchFamily="34" charset="-78"/>
+              <a:latin typeface="Calibri" panose="020F0502020204030204" pitchFamily="34" charset="0"/>
+              <a:cs typeface="Calibri" panose="020F0502020204030204" pitchFamily="34" charset="0"/>
             </a:endParaRPr>
           </a:p>
         </p:txBody>
@@ -14498,7 +14693,10 @@
           <a:lstStyle/>
           <a:p>
             <a:r>
-              <a:rPr lang="en-US" dirty="0"/>
+              <a:rPr lang="en-US" dirty="0">
+                <a:latin typeface="Calibri" panose="020F0502020204030204" pitchFamily="34" charset="0"/>
+                <a:cs typeface="Calibri" panose="020F0502020204030204" pitchFamily="34" charset="0"/>
+              </a:rPr>
               <a:t>Sample Footer Text</a:t>
             </a:r>
           </a:p>
@@ -14531,11 +14729,17 @@
           <a:lstStyle/>
           <a:p>
             <a:fld id="{8B48EBF6-60E6-462A-9155-5FAF136BCCBC}" type="slidenum">
-              <a:rPr lang="en-US" smtClean="0"/>
+              <a:rPr lang="en-US" smtClean="0">
+                <a:latin typeface="Calibri" panose="020F0502020204030204" pitchFamily="34" charset="0"/>
+                <a:cs typeface="Calibri" panose="020F0502020204030204" pitchFamily="34" charset="0"/>
+              </a:rPr>
               <a:pPr/>
               <a:t>4</a:t>
             </a:fld>
-            <a:endParaRPr lang="en-US" dirty="0"/>
+            <a:endParaRPr lang="en-US" dirty="0">
+              <a:latin typeface="Calibri" panose="020F0502020204030204" pitchFamily="34" charset="0"/>
+              <a:cs typeface="Calibri" panose="020F0502020204030204" pitchFamily="34" charset="0"/>
+            </a:endParaRPr>
           </a:p>
         </p:txBody>
       </p:sp>
@@ -14569,13 +14773,13 @@
           <a:p>
             <a:pPr algn="ctr" rtl="1"/>
             <a:r>
-              <a:rPr lang="fa-IR" sz="2800" b="0" i="0" dirty="0">
+              <a:rPr lang="fa-IR" sz="2800" b="1" i="0" dirty="0">
                 <a:solidFill>
                   <a:srgbClr val="EB5A64"/>
                 </a:solidFill>
                 <a:effectLst/>
-                <a:latin typeface="IRANSans" panose="020B0506030804020204" pitchFamily="34" charset="-78"/>
-                <a:cs typeface="IRANSans" panose="020B0506030804020204" pitchFamily="34" charset="-78"/>
+                <a:latin typeface="Calibri" panose="020F0502020204030204" pitchFamily="34" charset="0"/>
+                <a:cs typeface="Calibri" panose="020F0502020204030204" pitchFamily="34" charset="0"/>
               </a:rPr>
               <a:t>الگویتم های پیاده سازی شده:</a:t>
             </a:r>
@@ -14779,12 +14983,12 @@
               <a:buChar char="•"/>
             </a:pPr>
             <a:r>
-              <a:rPr lang="fa-IR" sz="1600" dirty="0">
+              <a:rPr lang="fa-IR" sz="2400" b="1" dirty="0">
                 <a:solidFill>
                   <a:srgbClr val="202122"/>
                 </a:solidFill>
-                <a:latin typeface="IRANSans" panose="020B0506030804020204" pitchFamily="34" charset="-78"/>
-                <a:cs typeface="IRANSans" panose="020B0506030804020204" pitchFamily="34" charset="-78"/>
+                <a:latin typeface="Calibri" panose="020F0502020204030204" pitchFamily="34" charset="0"/>
+                <a:cs typeface="Calibri" panose="020F0502020204030204" pitchFamily="34" charset="0"/>
               </a:rPr>
               <a:t>اضافه کردن</a:t>
             </a:r>
@@ -14795,13 +14999,13 @@
               <a:buChar char="•"/>
             </a:pPr>
             <a:r>
-              <a:rPr lang="fa-IR" sz="1600" b="0" i="0" dirty="0">
+              <a:rPr lang="fa-IR" sz="2400" b="1" i="0" dirty="0">
                 <a:solidFill>
                   <a:srgbClr val="202122"/>
                 </a:solidFill>
                 <a:effectLst/>
-                <a:latin typeface="IRANSans" panose="020B0506030804020204" pitchFamily="34" charset="-78"/>
-                <a:cs typeface="IRANSans" panose="020B0506030804020204" pitchFamily="34" charset="-78"/>
+                <a:latin typeface="Calibri" panose="020F0502020204030204" pitchFamily="34" charset="0"/>
+                <a:cs typeface="Calibri" panose="020F0502020204030204" pitchFamily="34" charset="0"/>
               </a:rPr>
               <a:t>حذف کردن</a:t>
             </a:r>
@@ -14812,12 +15016,12 @@
               <a:buChar char="•"/>
             </a:pPr>
             <a:r>
-              <a:rPr lang="fa-IR" sz="1600" dirty="0">
+              <a:rPr lang="fa-IR" sz="2400" b="1" dirty="0">
                 <a:solidFill>
                   <a:srgbClr val="202122"/>
                 </a:solidFill>
-                <a:latin typeface="IRANSans" panose="020B0506030804020204" pitchFamily="34" charset="-78"/>
-                <a:cs typeface="IRANSans" panose="020B0506030804020204" pitchFamily="34" charset="-78"/>
+                <a:latin typeface="Calibri" panose="020F0502020204030204" pitchFamily="34" charset="0"/>
+                <a:cs typeface="Calibri" panose="020F0502020204030204" pitchFamily="34" charset="0"/>
               </a:rPr>
               <a:t>جستجو یک مقدار در صف</a:t>
             </a:r>
@@ -14828,13 +15032,13 @@
               <a:buChar char="•"/>
             </a:pPr>
             <a:r>
-              <a:rPr lang="fa-IR" sz="1600" b="0" i="0" dirty="0">
+              <a:rPr lang="fa-IR" sz="2400" b="1" i="0" dirty="0">
                 <a:solidFill>
                   <a:srgbClr val="202122"/>
                 </a:solidFill>
                 <a:effectLst/>
-                <a:latin typeface="IRANSans" panose="020B0506030804020204" pitchFamily="34" charset="-78"/>
-                <a:cs typeface="IRANSans" panose="020B0506030804020204" pitchFamily="34" charset="-78"/>
+                <a:latin typeface="Calibri" panose="020F0502020204030204" pitchFamily="34" charset="0"/>
+                <a:cs typeface="Calibri" panose="020F0502020204030204" pitchFamily="34" charset="0"/>
               </a:rPr>
               <a:t>ادغام دو صف</a:t>
             </a:r>
@@ -14899,7 +15103,10 @@
           <a:lstStyle/>
           <a:p>
             <a:r>
-              <a:rPr lang="en-US" dirty="0"/>
+              <a:rPr lang="en-US" dirty="0">
+                <a:latin typeface="Calibri" panose="020F0502020204030204" pitchFamily="34" charset="0"/>
+                <a:cs typeface="Calibri" panose="020F0502020204030204" pitchFamily="34" charset="0"/>
+              </a:rPr>
               <a:t>Sample Footer Text</a:t>
             </a:r>
           </a:p>
@@ -14932,11 +15139,17 @@
           <a:lstStyle/>
           <a:p>
             <a:fld id="{8B48EBF6-60E6-462A-9155-5FAF136BCCBC}" type="slidenum">
-              <a:rPr lang="en-US" smtClean="0"/>
+              <a:rPr lang="en-US" smtClean="0">
+                <a:latin typeface="Calibri" panose="020F0502020204030204" pitchFamily="34" charset="0"/>
+                <a:cs typeface="Calibri" panose="020F0502020204030204" pitchFamily="34" charset="0"/>
+              </a:rPr>
               <a:pPr/>
               <a:t>5</a:t>
             </a:fld>
-            <a:endParaRPr lang="en-US" dirty="0"/>
+            <a:endParaRPr lang="en-US" dirty="0">
+              <a:latin typeface="Calibri" panose="020F0502020204030204" pitchFamily="34" charset="0"/>
+              <a:cs typeface="Calibri" panose="020F0502020204030204" pitchFamily="34" charset="0"/>
+            </a:endParaRPr>
           </a:p>
         </p:txBody>
       </p:sp>
@@ -14962,8 +15175,8 @@
         </p:blipFill>
         <p:spPr>
           <a:xfrm>
-            <a:off x="337373" y="4246846"/>
-            <a:ext cx="2710627" cy="1837509"/>
+            <a:off x="457201" y="3429000"/>
+            <a:ext cx="3818083" cy="2588243"/>
           </a:xfrm>
           <a:prstGeom prst="rect">
             <a:avLst/>
@@ -15000,13 +15213,13 @@
           <a:p>
             <a:pPr algn="ctr" rtl="1"/>
             <a:r>
-              <a:rPr lang="fa-IR" sz="2800" b="0" i="0" dirty="0">
+              <a:rPr lang="fa-IR" sz="2800" b="1" i="0" dirty="0">
                 <a:solidFill>
                   <a:srgbClr val="EB5A64"/>
                 </a:solidFill>
                 <a:effectLst/>
-                <a:latin typeface="IRANSans" panose="020B0506030804020204" pitchFamily="34" charset="-78"/>
-                <a:cs typeface="IRANSans" panose="020B0506030804020204" pitchFamily="34" charset="-78"/>
+                <a:latin typeface="Calibri" panose="020F0502020204030204" pitchFamily="34" charset="0"/>
+                <a:cs typeface="Calibri" panose="020F0502020204030204" pitchFamily="34" charset="0"/>
               </a:rPr>
               <a:t>تعریف صف خطی:</a:t>
             </a:r>
@@ -15207,32 +15420,42 @@
           <a:p>
             <a:pPr algn="r" rtl="1"/>
             <a:r>
-              <a:rPr lang="fa-IR" sz="1500" dirty="0">
+              <a:rPr lang="fa-IR" dirty="0">
                 <a:solidFill>
                   <a:srgbClr val="202122"/>
                 </a:solidFill>
-                <a:latin typeface="IRANSans" panose="020B0506030804020204" pitchFamily="34" charset="-78"/>
-                <a:cs typeface="IRANSans" panose="020B0506030804020204" pitchFamily="34" charset="-78"/>
-              </a:rPr>
-              <a:t>صف لیستی است که عمل افزودن داده‌ها درون آن از انتهای لیست و عمل حذف داده‌ها از ابتدای لیست انجام می‌شود. مثل یک صف نانوایی داده‌ها به ترتیب ورود پشت سر هم در صف قرار می‌گیرند. بنابراین اولین داده ورودی اولین داده خروجی نیز خواهد بود، این به این معنی است که شیوهٔ عمل‌کرد صف براساس سیاست </a:t>
-            </a:r>
-            <a:r>
-              <a:rPr lang="en-US" sz="1500" dirty="0">
+                <a:latin typeface="Calibri" panose="020F0502020204030204" pitchFamily="34" charset="0"/>
+                <a:cs typeface="Calibri" panose="020F0502020204030204" pitchFamily="34" charset="0"/>
+              </a:rPr>
+              <a:t>صف لیستی است که عمل افزودن داده‌ها درون آن از انتهای لیست و عمل حذف داده‌ها از ابتدای لیست انجام می‌شود. مثل یک صف نانوایی داده‌ها به ترتیب ورود پشت سر هم در صف قرار می‌گیرند. بنابراین اولین داده ورودی اولین داده خروجی نیز خواهد بود، این به این معنی است که شیوهٔ عمل‌کرد صف براساس سیاست</a:t>
+            </a:r>
+            <a:r>
+              <a:rPr lang="en-US" b="1" dirty="0">
                 <a:solidFill>
                   <a:srgbClr val="202122"/>
                 </a:solidFill>
-                <a:latin typeface="IRANSans" panose="020B0506030804020204" pitchFamily="34" charset="-78"/>
-                <a:cs typeface="IRANSans" panose="020B0506030804020204" pitchFamily="34" charset="-78"/>
-              </a:rPr>
-              <a:t>FIFO </a:t>
-            </a:r>
-            <a:r>
-              <a:rPr lang="fa-IR" sz="1500" dirty="0">
+                <a:latin typeface="Calibri" panose="020F0502020204030204" pitchFamily="34" charset="0"/>
+                <a:cs typeface="Calibri" panose="020F0502020204030204" pitchFamily="34" charset="0"/>
+              </a:rPr>
+              <a:t>FIFO</a:t>
+            </a:r>
+            <a:r>
+              <a:rPr lang="en-US" dirty="0">
                 <a:solidFill>
                   <a:srgbClr val="202122"/>
                 </a:solidFill>
-                <a:latin typeface="IRANSans" panose="020B0506030804020204" pitchFamily="34" charset="-78"/>
-                <a:cs typeface="IRANSans" panose="020B0506030804020204" pitchFamily="34" charset="-78"/>
+                <a:latin typeface="Calibri" panose="020F0502020204030204" pitchFamily="34" charset="0"/>
+                <a:cs typeface="Calibri" panose="020F0502020204030204" pitchFamily="34" charset="0"/>
+              </a:rPr>
+              <a:t> </a:t>
+            </a:r>
+            <a:r>
+              <a:rPr lang="fa-IR" dirty="0">
+                <a:solidFill>
+                  <a:srgbClr val="202122"/>
+                </a:solidFill>
+                <a:latin typeface="Calibri" panose="020F0502020204030204" pitchFamily="34" charset="0"/>
+                <a:cs typeface="Calibri" panose="020F0502020204030204" pitchFamily="34" charset="0"/>
               </a:rPr>
               <a:t> است.</a:t>
             </a:r>
@@ -15297,7 +15520,10 @@
           <a:lstStyle/>
           <a:p>
             <a:r>
-              <a:rPr lang="en-US" dirty="0"/>
+              <a:rPr lang="en-US" dirty="0">
+                <a:latin typeface="Calibri" panose="020F0502020204030204" pitchFamily="34" charset="0"/>
+                <a:cs typeface="Calibri" panose="020F0502020204030204" pitchFamily="34" charset="0"/>
+              </a:rPr>
               <a:t>Sample Footer Text</a:t>
             </a:r>
           </a:p>
@@ -15347,24 +15573,24 @@
                 <a:effectLst/>
                 <a:latin typeface="Calibri" panose="020F0502020204030204" pitchFamily="34" charset="0"/>
                 <a:ea typeface="Calibri" panose="020F0502020204030204" pitchFamily="34" charset="0"/>
-                <a:cs typeface="IRANSans" panose="020B0506030804020204" pitchFamily="34" charset="-78"/>
+                <a:cs typeface="Calibri" panose="020F0502020204030204" pitchFamily="34" charset="0"/>
               </a:rPr>
               <a:t>برای متغیر ایجاد شده از نوع کلاس صف خطی، تابع </a:t>
             </a:r>
             <a:r>
               <a:rPr lang="en-US" sz="1800" dirty="0" err="1">
                 <a:effectLst/>
-                <a:latin typeface="IRANSans" panose="020B0506030804020204" pitchFamily="34" charset="-78"/>
+                <a:latin typeface="Calibri" panose="020F0502020204030204" pitchFamily="34" charset="0"/>
                 <a:ea typeface="Calibri" panose="020F0502020204030204" pitchFamily="34" charset="0"/>
-                <a:cs typeface="Arial" panose="020B0604020202020204" pitchFamily="34" charset="0"/>
-              </a:rPr>
-              <a:t>inQeueu</a:t>
+                <a:cs typeface="Calibri" panose="020F0502020204030204" pitchFamily="34" charset="0"/>
+              </a:rPr>
+              <a:t>inQueue</a:t>
             </a:r>
             <a:r>
               <a:rPr lang="en-US" dirty="0">
-                <a:latin typeface="IRANSans" panose="020B0506030804020204" pitchFamily="34" charset="-78"/>
+                <a:latin typeface="Calibri" panose="020F0502020204030204" pitchFamily="34" charset="0"/>
                 <a:ea typeface="Calibri" panose="020F0502020204030204" pitchFamily="34" charset="0"/>
-                <a:cs typeface="Arial" panose="020B0604020202020204" pitchFamily="34" charset="0"/>
+                <a:cs typeface="Calibri" panose="020F0502020204030204" pitchFamily="34" charset="0"/>
               </a:rPr>
               <a:t>()</a:t>
             </a:r>
@@ -15373,15 +15599,37 @@
                 <a:effectLst/>
                 <a:latin typeface="Calibri" panose="020F0502020204030204" pitchFamily="34" charset="0"/>
                 <a:ea typeface="Calibri" panose="020F0502020204030204" pitchFamily="34" charset="0"/>
-                <a:cs typeface="IRANSans" panose="020B0506030804020204" pitchFamily="34" charset="-78"/>
-              </a:rPr>
-              <a:t> را فراخوانی می کنیم که این تابع، یک آرگومان ورودی دارد که مقدار عضو جدید صف است. پس از فراخوانی تابع، آرگومان ورودی به آخر لیست اضافه می شود. مثال:</a:t>
+                <a:cs typeface="Calibri" panose="020F0502020204030204" pitchFamily="34" charset="0"/>
+              </a:rPr>
+              <a:t> را فراخوانی می کنیم که این تابع، یک آرگومان ورودی دارد که مقدار عضو جدید صف است.</a:t>
+            </a:r>
+          </a:p>
+          <a:p>
+            <a:pPr marL="0" marR="0" algn="r" rtl="1">
+              <a:lnSpc>
+                <a:spcPct val="107000"/>
+              </a:lnSpc>
+              <a:spcBef>
+                <a:spcPts val="0"/>
+              </a:spcBef>
+              <a:spcAft>
+                <a:spcPts val="800"/>
+              </a:spcAft>
+            </a:pPr>
+            <a:r>
+              <a:rPr lang="fa-IR" sz="1800" dirty="0">
+                <a:effectLst/>
+                <a:latin typeface="Calibri" panose="020F0502020204030204" pitchFamily="34" charset="0"/>
+                <a:ea typeface="Calibri" panose="020F0502020204030204" pitchFamily="34" charset="0"/>
+                <a:cs typeface="Calibri" panose="020F0502020204030204" pitchFamily="34" charset="0"/>
+              </a:rPr>
+              <a:t>پس از فراخوانی تابع، آرگومان ورودی به آخر لیست اضافه می شود. مثال:</a:t>
             </a:r>
             <a:endParaRPr lang="en-US" sz="1800" dirty="0">
               <a:effectLst/>
               <a:latin typeface="Calibri" panose="020F0502020204030204" pitchFamily="34" charset="0"/>
               <a:ea typeface="Calibri" panose="020F0502020204030204" pitchFamily="34" charset="0"/>
-              <a:cs typeface="Arial" panose="020B0604020202020204" pitchFamily="34" charset="0"/>
+              <a:cs typeface="Calibri" panose="020F0502020204030204" pitchFamily="34" charset="0"/>
             </a:endParaRPr>
           </a:p>
           <a:p>
@@ -15399,35 +15647,35 @@
             <a:r>
               <a:rPr lang="en-US" sz="1800" dirty="0">
                 <a:effectLst/>
-                <a:latin typeface="IRANSans" panose="020B0506030804020204" pitchFamily="34" charset="-78"/>
+                <a:latin typeface="Calibri" panose="020F0502020204030204" pitchFamily="34" charset="0"/>
                 <a:ea typeface="Calibri" panose="020F0502020204030204" pitchFamily="34" charset="0"/>
-                <a:cs typeface="Arial" panose="020B0604020202020204" pitchFamily="34" charset="0"/>
+                <a:cs typeface="Calibri" panose="020F0502020204030204" pitchFamily="34" charset="0"/>
               </a:rPr>
               <a:t>Q</a:t>
             </a:r>
             <a:r>
               <a:rPr lang="en-US" dirty="0">
-                <a:latin typeface="IRANSans" panose="020B0506030804020204" pitchFamily="34" charset="-78"/>
+                <a:latin typeface="Calibri" panose="020F0502020204030204" pitchFamily="34" charset="0"/>
                 <a:ea typeface="Calibri" panose="020F0502020204030204" pitchFamily="34" charset="0"/>
-                <a:cs typeface="Arial" panose="020B0604020202020204" pitchFamily="34" charset="0"/>
+                <a:cs typeface="Calibri" panose="020F0502020204030204" pitchFamily="34" charset="0"/>
               </a:rPr>
               <a:t>1</a:t>
             </a:r>
             <a:r>
               <a:rPr lang="en-US" sz="1800" dirty="0">
                 <a:effectLst/>
-                <a:latin typeface="IRANSans" panose="020B0506030804020204" pitchFamily="34" charset="-78"/>
+                <a:latin typeface="Calibri" panose="020F0502020204030204" pitchFamily="34" charset="0"/>
                 <a:ea typeface="Calibri" panose="020F0502020204030204" pitchFamily="34" charset="0"/>
-                <a:cs typeface="Arial" panose="020B0604020202020204" pitchFamily="34" charset="0"/>
+                <a:cs typeface="Calibri" panose="020F0502020204030204" pitchFamily="34" charset="0"/>
               </a:rPr>
               <a:t>.inQueue("Farvardin")</a:t>
             </a:r>
             <a:r>
               <a:rPr lang="fa-IR" sz="1800" dirty="0">
                 <a:effectLst/>
-                <a:latin typeface="IRANSans" panose="020B0506030804020204" pitchFamily="34" charset="-78"/>
+                <a:latin typeface="Calibri" panose="020F0502020204030204" pitchFamily="34" charset="0"/>
                 <a:ea typeface="Calibri" panose="020F0502020204030204" pitchFamily="34" charset="0"/>
-                <a:cs typeface="Arial" panose="020B0604020202020204" pitchFamily="34" charset="0"/>
+                <a:cs typeface="Calibri" panose="020F0502020204030204" pitchFamily="34" charset="0"/>
               </a:rPr>
               <a:t>;</a:t>
             </a:r>
@@ -15435,7 +15683,7 @@
               <a:effectLst/>
               <a:latin typeface="Calibri" panose="020F0502020204030204" pitchFamily="34" charset="0"/>
               <a:ea typeface="Calibri" panose="020F0502020204030204" pitchFamily="34" charset="0"/>
-              <a:cs typeface="Arial" panose="020B0604020202020204" pitchFamily="34" charset="0"/>
+              <a:cs typeface="Calibri" panose="020F0502020204030204" pitchFamily="34" charset="0"/>
             </a:endParaRPr>
           </a:p>
         </p:txBody>
@@ -15467,11 +15715,17 @@
           <a:lstStyle/>
           <a:p>
             <a:fld id="{8B48EBF6-60E6-462A-9155-5FAF136BCCBC}" type="slidenum">
-              <a:rPr lang="en-US" smtClean="0"/>
+              <a:rPr lang="en-US" smtClean="0">
+                <a:latin typeface="Calibri" panose="020F0502020204030204" pitchFamily="34" charset="0"/>
+                <a:cs typeface="Calibri" panose="020F0502020204030204" pitchFamily="34" charset="0"/>
+              </a:rPr>
               <a:pPr/>
               <a:t>6</a:t>
             </a:fld>
-            <a:endParaRPr lang="en-US" dirty="0"/>
+            <a:endParaRPr lang="en-US" dirty="0">
+              <a:latin typeface="Calibri" panose="020F0502020204030204" pitchFamily="34" charset="0"/>
+              <a:cs typeface="Calibri" panose="020F0502020204030204" pitchFamily="34" charset="0"/>
+            </a:endParaRPr>
           </a:p>
         </p:txBody>
       </p:sp>
@@ -15505,13 +15759,13 @@
           <a:p>
             <a:pPr algn="ctr" rtl="1"/>
             <a:r>
-              <a:rPr lang="fa-IR" sz="2800" b="0" i="0" dirty="0">
+              <a:rPr lang="fa-IR" sz="2800" b="1" i="0" dirty="0">
                 <a:solidFill>
                   <a:srgbClr val="EB5A64"/>
                 </a:solidFill>
                 <a:effectLst/>
-                <a:latin typeface="IRANSans" panose="020B0506030804020204" pitchFamily="34" charset="-78"/>
-                <a:cs typeface="IRANSans" panose="020B0506030804020204" pitchFamily="34" charset="-78"/>
+                <a:latin typeface="Calibri" panose="020F0502020204030204" pitchFamily="34" charset="0"/>
+                <a:cs typeface="Calibri" panose="020F0502020204030204" pitchFamily="34" charset="0"/>
               </a:rPr>
               <a:t>الگوریتم اضافه کردن صف خطی:</a:t>
             </a:r>
@@ -15576,7 +15830,10 @@
           <a:lstStyle/>
           <a:p>
             <a:r>
-              <a:rPr lang="en-US" dirty="0"/>
+              <a:rPr lang="en-US" dirty="0">
+                <a:latin typeface="Calibri" panose="020F0502020204030204" pitchFamily="34" charset="0"/>
+                <a:cs typeface="Calibri" panose="020F0502020204030204" pitchFamily="34" charset="0"/>
+              </a:rPr>
               <a:t>Sample Footer Text</a:t>
             </a:r>
           </a:p>
@@ -15600,8 +15857,8 @@
         </p:nvSpPr>
         <p:spPr>
           <a:xfrm>
-            <a:off x="2103120" y="1743891"/>
-            <a:ext cx="7985760" cy="2812869"/>
+            <a:off x="1607889" y="2705995"/>
+            <a:ext cx="8976221" cy="1236830"/>
           </a:xfrm>
         </p:spPr>
         <p:txBody>
@@ -15622,56 +15879,100 @@
               </a:spcAft>
             </a:pPr>
             <a:r>
-              <a:rPr lang="fa-IR" sz="1800" dirty="0">
+              <a:rPr lang="fa-IR" sz="2400" dirty="0">
                 <a:effectLst/>
-                <a:latin typeface="IRANSans" panose="020B0506030804020204" pitchFamily="34" charset="-78"/>
+                <a:latin typeface="Calibri" panose="020F0502020204030204" pitchFamily="34" charset="0"/>
                 <a:ea typeface="Calibri" panose="020F0502020204030204" pitchFamily="34" charset="0"/>
-                <a:cs typeface="IRANSans" panose="020B0506030804020204" pitchFamily="34" charset="-78"/>
-              </a:rPr>
-              <a:t>برای حذف آخرین عضو وارد شده به صف خطی، تابع ()</a:t>
-            </a:r>
-            <a:r>
-              <a:rPr lang="en-US" sz="1800" dirty="0" err="1">
+                <a:cs typeface="Calibri" panose="020F0502020204030204" pitchFamily="34" charset="0"/>
+              </a:rPr>
+              <a:t>برای حذف از صف خطی اولین عنصر وارد شده خارج می</a:t>
+            </a:r>
+            <a:r>
+              <a:rPr lang="en-US" sz="2400" dirty="0">
                 <a:effectLst/>
-                <a:latin typeface="IRANSans" panose="020B0506030804020204" pitchFamily="34" charset="-78"/>
+                <a:latin typeface="Calibri" panose="020F0502020204030204" pitchFamily="34" charset="0"/>
                 <a:ea typeface="Calibri" panose="020F0502020204030204" pitchFamily="34" charset="0"/>
-                <a:cs typeface="IRANSans" panose="020B0506030804020204" pitchFamily="34" charset="-78"/>
+                <a:cs typeface="Calibri" panose="020F0502020204030204" pitchFamily="34" charset="0"/>
+              </a:rPr>
+              <a:t> </a:t>
+            </a:r>
+            <a:r>
+              <a:rPr lang="fa-IR" sz="2400" dirty="0">
+                <a:effectLst/>
+                <a:latin typeface="Calibri" panose="020F0502020204030204" pitchFamily="34" charset="0"/>
+                <a:ea typeface="Calibri" panose="020F0502020204030204" pitchFamily="34" charset="0"/>
+                <a:cs typeface="Calibri" panose="020F0502020204030204" pitchFamily="34" charset="0"/>
+              </a:rPr>
+              <a:t>شود که</a:t>
+            </a:r>
+            <a:r>
+              <a:rPr lang="en-US" sz="2400" dirty="0">
+                <a:effectLst/>
+                <a:latin typeface="Calibri" panose="020F0502020204030204" pitchFamily="34" charset="0"/>
+                <a:ea typeface="Calibri" panose="020F0502020204030204" pitchFamily="34" charset="0"/>
+                <a:cs typeface="Calibri" panose="020F0502020204030204" pitchFamily="34" charset="0"/>
+              </a:rPr>
+              <a:t> </a:t>
+            </a:r>
+            <a:r>
+              <a:rPr lang="fa-IR" sz="2400" dirty="0">
+                <a:effectLst/>
+                <a:latin typeface="Calibri" panose="020F0502020204030204" pitchFamily="34" charset="0"/>
+                <a:ea typeface="Calibri" panose="020F0502020204030204" pitchFamily="34" charset="0"/>
+                <a:cs typeface="Calibri" panose="020F0502020204030204" pitchFamily="34" charset="0"/>
+              </a:rPr>
+              <a:t>تابع ()</a:t>
+            </a:r>
+            <a:r>
+              <a:rPr lang="en-US" sz="2400" dirty="0">
+                <a:effectLst/>
+                <a:latin typeface="Calibri" panose="020F0502020204030204" pitchFamily="34" charset="0"/>
+                <a:ea typeface="Calibri" panose="020F0502020204030204" pitchFamily="34" charset="0"/>
+                <a:cs typeface="Calibri" panose="020F0502020204030204" pitchFamily="34" charset="0"/>
+              </a:rPr>
+              <a:t> </a:t>
+            </a:r>
+            <a:r>
+              <a:rPr lang="en-US" sz="2400" dirty="0" err="1">
+                <a:effectLst/>
+                <a:latin typeface="Calibri" panose="020F0502020204030204" pitchFamily="34" charset="0"/>
+                <a:ea typeface="Calibri" panose="020F0502020204030204" pitchFamily="34" charset="0"/>
+                <a:cs typeface="Calibri" panose="020F0502020204030204" pitchFamily="34" charset="0"/>
               </a:rPr>
               <a:t>deQueue</a:t>
             </a:r>
             <a:r>
-              <a:rPr lang="fa-IR" sz="1800" dirty="0">
+              <a:rPr lang="fa-IR" sz="2400" dirty="0">
                 <a:effectLst/>
-                <a:latin typeface="IRANSans" panose="020B0506030804020204" pitchFamily="34" charset="-78"/>
+                <a:latin typeface="Calibri" panose="020F0502020204030204" pitchFamily="34" charset="0"/>
                 <a:ea typeface="Calibri" panose="020F0502020204030204" pitchFamily="34" charset="0"/>
-                <a:cs typeface="IRANSans" panose="020B0506030804020204" pitchFamily="34" charset="-78"/>
-              </a:rPr>
-              <a:t> را فراخوانی می کنیم.</a:t>
-            </a:r>
-            <a:endParaRPr lang="en-US" sz="1800" dirty="0">
+                <a:cs typeface="Calibri" panose="020F0502020204030204" pitchFamily="34" charset="0"/>
+              </a:rPr>
+              <a:t>این کار را انجام می</a:t>
+            </a:r>
+            <a:r>
+              <a:rPr lang="en-US" sz="2400" dirty="0">
+                <a:effectLst/>
+                <a:latin typeface="Calibri" panose="020F0502020204030204" pitchFamily="34" charset="0"/>
+                <a:ea typeface="Calibri" panose="020F0502020204030204" pitchFamily="34" charset="0"/>
+                <a:cs typeface="Calibri" panose="020F0502020204030204" pitchFamily="34" charset="0"/>
+              </a:rPr>
+              <a:t> </a:t>
+            </a:r>
+            <a:r>
+              <a:rPr lang="fa-IR" sz="2400" dirty="0">
+                <a:effectLst/>
+                <a:latin typeface="Calibri" panose="020F0502020204030204" pitchFamily="34" charset="0"/>
+                <a:ea typeface="Calibri" panose="020F0502020204030204" pitchFamily="34" charset="0"/>
+                <a:cs typeface="Calibri" panose="020F0502020204030204" pitchFamily="34" charset="0"/>
+              </a:rPr>
+              <a:t>دهد.</a:t>
+            </a:r>
+            <a:endParaRPr lang="en-US" sz="1600" dirty="0">
               <a:effectLst/>
-              <a:latin typeface="IRANSans" panose="020B0506030804020204" pitchFamily="34" charset="-78"/>
+              <a:latin typeface="Calibri" panose="020F0502020204030204" pitchFamily="34" charset="0"/>
               <a:ea typeface="Calibri" panose="020F0502020204030204" pitchFamily="34" charset="0"/>
-              <a:cs typeface="IRANSans" panose="020B0506030804020204" pitchFamily="34" charset="-78"/>
-            </a:endParaRPr>
-          </a:p>
-          <a:p>
-            <a:pPr marL="0" marR="0">
-              <a:lnSpc>
-                <a:spcPct val="107000"/>
-              </a:lnSpc>
-              <a:spcBef>
-                <a:spcPts val="0"/>
-              </a:spcBef>
-              <a:spcAft>
-                <a:spcPts val="800"/>
-              </a:spcAft>
-            </a:pPr>
-            <a:endParaRPr lang="en-US" sz="1500" dirty="0">
-              <a:effectLst/>
-              <a:latin typeface="IRANSans" panose="020B0506030804020204" pitchFamily="34" charset="-78"/>
-              <a:ea typeface="Calibri" panose="020F0502020204030204" pitchFamily="34" charset="0"/>
-              <a:cs typeface="IRANSans" panose="020B0506030804020204" pitchFamily="34" charset="-78"/>
+              <a:cs typeface="Calibri" panose="020F0502020204030204" pitchFamily="34" charset="0"/>
             </a:endParaRPr>
           </a:p>
           <a:p>
@@ -15681,8 +15982,8 @@
                 <a:srgbClr val="202122"/>
               </a:solidFill>
               <a:effectLst/>
-              <a:latin typeface="IRANSans" panose="020B0506030804020204" pitchFamily="34" charset="-78"/>
-              <a:cs typeface="IRANSans" panose="020B0506030804020204" pitchFamily="34" charset="-78"/>
+              <a:latin typeface="Calibri" panose="020F0502020204030204" pitchFamily="34" charset="0"/>
+              <a:cs typeface="Calibri" panose="020F0502020204030204" pitchFamily="34" charset="0"/>
             </a:endParaRPr>
           </a:p>
         </p:txBody>
@@ -15714,11 +16015,17 @@
           <a:lstStyle/>
           <a:p>
             <a:fld id="{8B48EBF6-60E6-462A-9155-5FAF136BCCBC}" type="slidenum">
-              <a:rPr lang="en-US" smtClean="0"/>
+              <a:rPr lang="en-US" smtClean="0">
+                <a:latin typeface="Calibri" panose="020F0502020204030204" pitchFamily="34" charset="0"/>
+                <a:cs typeface="Calibri" panose="020F0502020204030204" pitchFamily="34" charset="0"/>
+              </a:rPr>
               <a:pPr/>
               <a:t>7</a:t>
             </a:fld>
-            <a:endParaRPr lang="en-US" dirty="0"/>
+            <a:endParaRPr lang="en-US" dirty="0">
+              <a:latin typeface="Calibri" panose="020F0502020204030204" pitchFamily="34" charset="0"/>
+              <a:cs typeface="Calibri" panose="020F0502020204030204" pitchFamily="34" charset="0"/>
+            </a:endParaRPr>
           </a:p>
         </p:txBody>
       </p:sp>
@@ -15736,7 +16043,7 @@
         </p:nvSpPr>
         <p:spPr>
           <a:xfrm>
-            <a:off x="3048000" y="773645"/>
+            <a:off x="3048000" y="1184705"/>
             <a:ext cx="6096000" cy="523220"/>
           </a:xfrm>
           <a:prstGeom prst="rect">
@@ -15752,13 +16059,13 @@
           <a:p>
             <a:pPr algn="ctr" rtl="1"/>
             <a:r>
-              <a:rPr lang="fa-IR" sz="2800" b="0" i="0" dirty="0">
+              <a:rPr lang="fa-IR" sz="2800" b="1" i="0" dirty="0">
                 <a:solidFill>
                   <a:srgbClr val="EB5A64"/>
                 </a:solidFill>
                 <a:effectLst/>
-                <a:latin typeface="IRANSans" panose="020B0506030804020204" pitchFamily="34" charset="-78"/>
-                <a:cs typeface="IRANSans" panose="020B0506030804020204" pitchFamily="34" charset="-78"/>
+                <a:latin typeface="Calibri" panose="020F0502020204030204" pitchFamily="34" charset="0"/>
+                <a:cs typeface="Calibri" panose="020F0502020204030204" pitchFamily="34" charset="0"/>
               </a:rPr>
               <a:t>الگوریتم حذف کردن صف خطی:</a:t>
             </a:r>
@@ -15823,7 +16130,10 @@
           <a:lstStyle/>
           <a:p>
             <a:r>
-              <a:rPr lang="en-US" dirty="0"/>
+              <a:rPr lang="en-US" dirty="0">
+                <a:latin typeface="Calibri" panose="020F0502020204030204" pitchFamily="34" charset="0"/>
+                <a:cs typeface="Calibri" panose="020F0502020204030204" pitchFamily="34" charset="0"/>
+              </a:rPr>
               <a:t>Sample Footer Text</a:t>
             </a:r>
           </a:p>
@@ -15862,8 +16172,8 @@
               <a:buChar char="•"/>
             </a:pPr>
             <a:endParaRPr lang="en-US" sz="2400" dirty="0">
-              <a:latin typeface="IRANSans" panose="020B0506030804020204" pitchFamily="34" charset="-78"/>
-              <a:cs typeface="IRANSans" panose="020B0506030804020204" pitchFamily="34" charset="-78"/>
+              <a:latin typeface="Calibri" panose="020F0502020204030204" pitchFamily="34" charset="0"/>
+              <a:cs typeface="Calibri" panose="020F0502020204030204" pitchFamily="34" charset="0"/>
             </a:endParaRPr>
           </a:p>
           <a:p>
@@ -15872,8 +16182,8 @@
               <a:buChar char="•"/>
             </a:pPr>
             <a:endParaRPr lang="fa-IR" sz="2400" dirty="0">
-              <a:latin typeface="IRANSans" panose="020B0506030804020204" pitchFamily="34" charset="-78"/>
-              <a:cs typeface="IRANSans" panose="020B0506030804020204" pitchFamily="34" charset="-78"/>
+              <a:latin typeface="Calibri" panose="020F0502020204030204" pitchFamily="34" charset="0"/>
+              <a:cs typeface="Calibri" panose="020F0502020204030204" pitchFamily="34" charset="0"/>
             </a:endParaRPr>
           </a:p>
         </p:txBody>
@@ -15905,11 +16215,17 @@
           <a:lstStyle/>
           <a:p>
             <a:fld id="{8B48EBF6-60E6-462A-9155-5FAF136BCCBC}" type="slidenum">
-              <a:rPr lang="en-US" smtClean="0"/>
+              <a:rPr lang="en-US" smtClean="0">
+                <a:latin typeface="Calibri" panose="020F0502020204030204" pitchFamily="34" charset="0"/>
+                <a:cs typeface="Calibri" panose="020F0502020204030204" pitchFamily="34" charset="0"/>
+              </a:rPr>
               <a:pPr/>
               <a:t>8</a:t>
             </a:fld>
-            <a:endParaRPr lang="en-US" dirty="0"/>
+            <a:endParaRPr lang="en-US" dirty="0">
+              <a:latin typeface="Calibri" panose="020F0502020204030204" pitchFamily="34" charset="0"/>
+              <a:cs typeface="Calibri" panose="020F0502020204030204" pitchFamily="34" charset="0"/>
+            </a:endParaRPr>
           </a:p>
         </p:txBody>
       </p:sp>
@@ -15943,34 +16259,34 @@
           <a:p>
             <a:pPr algn="ctr" rtl="1"/>
             <a:r>
-              <a:rPr lang="fa-IR" sz="2800" b="0" i="0" dirty="0">
+              <a:rPr lang="fa-IR" sz="2800" b="1" i="0" dirty="0">
                 <a:solidFill>
                   <a:srgbClr val="EB5A64"/>
                 </a:solidFill>
                 <a:effectLst/>
-                <a:latin typeface="IRANSans" panose="020B0506030804020204" pitchFamily="34" charset="-78"/>
-                <a:cs typeface="IRANSans" panose="020B0506030804020204" pitchFamily="34" charset="-78"/>
+                <a:latin typeface="Calibri" panose="020F0502020204030204" pitchFamily="34" charset="0"/>
+                <a:cs typeface="Calibri" panose="020F0502020204030204" pitchFamily="34" charset="0"/>
               </a:rPr>
               <a:t>تعریف صف </a:t>
             </a:r>
             <a:r>
-              <a:rPr lang="fa-IR" sz="2800" dirty="0">
+              <a:rPr lang="fa-IR" sz="2800" b="1" dirty="0">
                 <a:solidFill>
                   <a:srgbClr val="EB5A64"/>
                 </a:solidFill>
-                <a:latin typeface="IRANSans" panose="020B0506030804020204" pitchFamily="34" charset="-78"/>
-                <a:cs typeface="IRANSans" panose="020B0506030804020204" pitchFamily="34" charset="-78"/>
+                <a:latin typeface="Calibri" panose="020F0502020204030204" pitchFamily="34" charset="0"/>
+                <a:cs typeface="Calibri" panose="020F0502020204030204" pitchFamily="34" charset="0"/>
               </a:rPr>
               <a:t>الویت دار</a:t>
             </a:r>
             <a:r>
-              <a:rPr lang="fa-IR" sz="2800" b="0" i="0" dirty="0">
+              <a:rPr lang="fa-IR" sz="2800" b="1" i="0" dirty="0">
                 <a:solidFill>
                   <a:srgbClr val="EB5A64"/>
                 </a:solidFill>
                 <a:effectLst/>
-                <a:latin typeface="IRANSans" panose="020B0506030804020204" pitchFamily="34" charset="-78"/>
-                <a:cs typeface="IRANSans" panose="020B0506030804020204" pitchFamily="34" charset="-78"/>
+                <a:latin typeface="Calibri" panose="020F0502020204030204" pitchFamily="34" charset="0"/>
+                <a:cs typeface="Calibri" panose="020F0502020204030204" pitchFamily="34" charset="0"/>
               </a:rPr>
               <a:t>:</a:t>
             </a:r>
@@ -15993,7 +16309,7 @@
         </p:nvSpPr>
         <p:spPr>
           <a:xfrm>
-            <a:off x="2168435" y="1875390"/>
+            <a:off x="2103120" y="1634484"/>
             <a:ext cx="7985760" cy="2812869"/>
           </a:xfrm>
           <a:prstGeom prst="rect">
@@ -16171,32 +16487,32 @@
           <a:p>
             <a:pPr algn="r" rtl="1"/>
             <a:r>
-              <a:rPr lang="fa-IR" sz="1500" dirty="0">
+              <a:rPr lang="fa-IR" dirty="0">
                 <a:solidFill>
                   <a:srgbClr val="202122"/>
                 </a:solidFill>
-                <a:latin typeface="IRANSans" panose="020B0506030804020204" pitchFamily="34" charset="-78"/>
-                <a:cs typeface="IRANSans" panose="020B0506030804020204" pitchFamily="34" charset="-78"/>
+                <a:latin typeface="Calibri" panose="020F0502020204030204" pitchFamily="34" charset="0"/>
+                <a:cs typeface="Calibri" panose="020F0502020204030204" pitchFamily="34" charset="0"/>
               </a:rPr>
               <a:t>در صف عادی از روش خروج به ترتیب ورود </a:t>
             </a:r>
             <a:r>
-              <a:rPr lang="en-US" sz="1500" dirty="0">
+              <a:rPr lang="en-US" dirty="0">
                 <a:solidFill>
                   <a:srgbClr val="202122"/>
                 </a:solidFill>
-                <a:latin typeface="IRANSans" panose="020B0506030804020204" pitchFamily="34" charset="-78"/>
-                <a:cs typeface="IRANSans" panose="020B0506030804020204" pitchFamily="34" charset="-78"/>
+                <a:latin typeface="Calibri" panose="020F0502020204030204" pitchFamily="34" charset="0"/>
+                <a:cs typeface="Calibri" panose="020F0502020204030204" pitchFamily="34" charset="0"/>
               </a:rPr>
               <a:t>(FIFO)</a:t>
             </a:r>
             <a:r>
-              <a:rPr lang="fa-IR" sz="1500" dirty="0">
+              <a:rPr lang="fa-IR" dirty="0">
                 <a:solidFill>
                   <a:srgbClr val="202122"/>
                 </a:solidFill>
-                <a:latin typeface="IRANSans" panose="020B0506030804020204" pitchFamily="34" charset="-78"/>
-                <a:cs typeface="IRANSans" panose="020B0506030804020204" pitchFamily="34" charset="-78"/>
+                <a:latin typeface="Calibri" panose="020F0502020204030204" pitchFamily="34" charset="0"/>
+                <a:cs typeface="Calibri" panose="020F0502020204030204" pitchFamily="34" charset="0"/>
               </a:rPr>
               <a:t> استفاده می‌شود. در این تکنیک مثل یک صف نانوایی داده‌ها به ترتیب ورود پشت سر هم در صف قرار می‌گیرند؛ بنابراین اولین داده ورودی اولین داده خروجی نیز خواهد بود.</a:t>
             </a:r>
@@ -16204,12 +16520,12 @@
           <a:p>
             <a:pPr algn="r" rtl="1"/>
             <a:r>
-              <a:rPr lang="fa-IR" sz="1500" dirty="0">
+              <a:rPr lang="fa-IR" dirty="0">
                 <a:solidFill>
                   <a:srgbClr val="202122"/>
                 </a:solidFill>
-                <a:latin typeface="IRANSans" panose="020B0506030804020204" pitchFamily="34" charset="-78"/>
-                <a:cs typeface="IRANSans" panose="020B0506030804020204" pitchFamily="34" charset="-78"/>
+                <a:latin typeface="Calibri" panose="020F0502020204030204" pitchFamily="34" charset="0"/>
+                <a:cs typeface="Calibri" panose="020F0502020204030204" pitchFamily="34" charset="0"/>
               </a:rPr>
               <a:t>اما در صف اولویت‌دار برای هر داده اولویتی - نه لزوماً منحصربه‌فرد - مشخص می‌شود. صف اولویت را می‌توان به اورژانس یک بیمارستان تشبیه کرد که هر بیمار با شدت بیماری بیشتر اولویت بیشتری برای رسیدگی دارد. سیستم‌عامل کامپیوتر هم برای مدیریت پردازش‌ها از صف‌های اولویت استفاده می‌کند.</a:t>
             </a:r>
@@ -16321,7 +16637,10 @@
           <a:lstStyle/>
           <a:p>
             <a:r>
-              <a:rPr lang="en-US" dirty="0"/>
+              <a:rPr lang="en-US" dirty="0">
+                <a:latin typeface="Calibri" panose="020F0502020204030204" pitchFamily="34" charset="0"/>
+                <a:cs typeface="Calibri" panose="020F0502020204030204" pitchFamily="34" charset="0"/>
+              </a:rPr>
               <a:t>Sample Footer Text</a:t>
             </a:r>
           </a:p>
@@ -16367,46 +16686,46 @@
               </a:spcAft>
             </a:pPr>
             <a:r>
-              <a:rPr lang="fa-IR" sz="1800" dirty="0">
+              <a:rPr lang="fa-IR" sz="2000" dirty="0">
                 <a:effectLst/>
                 <a:latin typeface="Calibri" panose="020F0502020204030204" pitchFamily="34" charset="0"/>
                 <a:ea typeface="Calibri" panose="020F0502020204030204" pitchFamily="34" charset="0"/>
-                <a:cs typeface="IRANSans" panose="020B0506030804020204" pitchFamily="34" charset="-78"/>
+                <a:cs typeface="Calibri" panose="020F0502020204030204" pitchFamily="34" charset="0"/>
               </a:rPr>
               <a:t>برای متغیر ایجاد شده از نوع کلاس صف الویت دار، تابع </a:t>
             </a:r>
             <a:r>
-              <a:rPr lang="en-US" sz="1800" dirty="0" err="1">
+              <a:rPr lang="en-US" sz="2000" dirty="0" err="1">
                 <a:effectLst/>
-                <a:latin typeface="IRANSans" panose="020B0506030804020204" pitchFamily="34" charset="-78"/>
+                <a:latin typeface="Calibri" panose="020F0502020204030204" pitchFamily="34" charset="0"/>
                 <a:ea typeface="Calibri" panose="020F0502020204030204" pitchFamily="34" charset="0"/>
-                <a:cs typeface="Arial" panose="020B0604020202020204" pitchFamily="34" charset="0"/>
-              </a:rPr>
-              <a:t>inQeueu</a:t>
-            </a:r>
-            <a:r>
-              <a:rPr lang="en-US" sz="1800" dirty="0">
+                <a:cs typeface="Calibri" panose="020F0502020204030204" pitchFamily="34" charset="0"/>
+              </a:rPr>
+              <a:t>inQueue</a:t>
+            </a:r>
+            <a:r>
+              <a:rPr lang="en-US" sz="2000" dirty="0">
                 <a:effectLst/>
-                <a:latin typeface="IRANSans" panose="020B0506030804020204" pitchFamily="34" charset="-78"/>
+                <a:latin typeface="Calibri" panose="020F0502020204030204" pitchFamily="34" charset="0"/>
                 <a:ea typeface="Calibri" panose="020F0502020204030204" pitchFamily="34" charset="0"/>
-                <a:cs typeface="Arial" panose="020B0604020202020204" pitchFamily="34" charset="0"/>
-              </a:rPr>
-              <a:t>()</a:t>
-            </a:r>
-            <a:r>
-              <a:rPr lang="fa-IR" sz="1800" dirty="0">
+                <a:cs typeface="Calibri" panose="020F0502020204030204" pitchFamily="34" charset="0"/>
+              </a:rPr>
+              <a:t> ()</a:t>
+            </a:r>
+            <a:r>
+              <a:rPr lang="fa-IR" sz="2000" dirty="0">
                 <a:effectLst/>
                 <a:latin typeface="Calibri" panose="020F0502020204030204" pitchFamily="34" charset="0"/>
                 <a:ea typeface="Calibri" panose="020F0502020204030204" pitchFamily="34" charset="0"/>
-                <a:cs typeface="IRANSans" panose="020B0506030804020204" pitchFamily="34" charset="-78"/>
-              </a:rPr>
-              <a:t> را فراخوانی می کنیم که این تابع، دو آرگومان ورودی دارد که اولین آرگومان، مقدار عضو جدید صف و دومین آرگومان، الویت آن در صف است. هر چه الویت بیشتر باشد، در صف جلوتر است. مثال: </a:t>
-            </a:r>
-            <a:endParaRPr lang="en-US" sz="1800" dirty="0">
+                <a:cs typeface="Calibri" panose="020F0502020204030204" pitchFamily="34" charset="0"/>
+              </a:rPr>
+              <a:t> را فراخوانی می کنیم که این تابع، دو آرگومان ورودی دارد که اولین آرگومان، مقدار عضو جدید صف و دومین آرگومان، اولویت آن در صف است. هر چه اولویت بیشتر باشد، در صف جلوتر است. مثال: </a:t>
+            </a:r>
+            <a:endParaRPr lang="en-US" sz="2000" dirty="0">
               <a:effectLst/>
               <a:latin typeface="Calibri" panose="020F0502020204030204" pitchFamily="34" charset="0"/>
               <a:ea typeface="Calibri" panose="020F0502020204030204" pitchFamily="34" charset="0"/>
-              <a:cs typeface="Arial" panose="020B0604020202020204" pitchFamily="34" charset="0"/>
+              <a:cs typeface="Calibri" panose="020F0502020204030204" pitchFamily="34" charset="0"/>
             </a:endParaRPr>
           </a:p>
           <a:p>
@@ -16422,44 +16741,44 @@
               </a:spcAft>
             </a:pPr>
             <a:r>
-              <a:rPr lang="en-US" sz="1800" dirty="0">
+              <a:rPr lang="en-US" sz="2000" dirty="0">
                 <a:effectLst/>
-                <a:latin typeface="IRANSans" panose="020B0506030804020204" pitchFamily="34" charset="-78"/>
+                <a:latin typeface="Calibri" panose="020F0502020204030204" pitchFamily="34" charset="0"/>
                 <a:ea typeface="Calibri" panose="020F0502020204030204" pitchFamily="34" charset="0"/>
-                <a:cs typeface="Arial" panose="020B0604020202020204" pitchFamily="34" charset="0"/>
+                <a:cs typeface="Calibri" panose="020F0502020204030204" pitchFamily="34" charset="0"/>
               </a:rPr>
               <a:t>Q</a:t>
             </a:r>
             <a:r>
-              <a:rPr lang="en-US" dirty="0">
-                <a:latin typeface="IRANSans" panose="020B0506030804020204" pitchFamily="34" charset="-78"/>
+              <a:rPr lang="en-US" sz="2000" dirty="0">
+                <a:latin typeface="Calibri" panose="020F0502020204030204" pitchFamily="34" charset="0"/>
                 <a:ea typeface="Calibri" panose="020F0502020204030204" pitchFamily="34" charset="0"/>
-                <a:cs typeface="Arial" panose="020B0604020202020204" pitchFamily="34" charset="0"/>
+                <a:cs typeface="Calibri" panose="020F0502020204030204" pitchFamily="34" charset="0"/>
               </a:rPr>
               <a:t>2</a:t>
             </a:r>
             <a:r>
-              <a:rPr lang="en-US" sz="1800" dirty="0">
+              <a:rPr lang="en-US" sz="2000" dirty="0">
                 <a:effectLst/>
-                <a:latin typeface="IRANSans" panose="020B0506030804020204" pitchFamily="34" charset="-78"/>
+                <a:latin typeface="Calibri" panose="020F0502020204030204" pitchFamily="34" charset="0"/>
                 <a:ea typeface="Calibri" panose="020F0502020204030204" pitchFamily="34" charset="0"/>
-                <a:cs typeface="Arial" panose="020B0604020202020204" pitchFamily="34" charset="0"/>
+                <a:cs typeface="Calibri" panose="020F0502020204030204" pitchFamily="34" charset="0"/>
               </a:rPr>
               <a:t>.inQueue</a:t>
             </a:r>
             <a:r>
-              <a:rPr lang="en-US" dirty="0">
-                <a:latin typeface="IRANSans" panose="020B0506030804020204" pitchFamily="34" charset="-78"/>
+              <a:rPr lang="en-US" sz="2000" dirty="0">
+                <a:latin typeface="Calibri" panose="020F0502020204030204" pitchFamily="34" charset="0"/>
                 <a:ea typeface="Calibri" panose="020F0502020204030204" pitchFamily="34" charset="0"/>
-                <a:cs typeface="Arial" panose="020B0604020202020204" pitchFamily="34" charset="0"/>
+                <a:cs typeface="Calibri" panose="020F0502020204030204" pitchFamily="34" charset="0"/>
               </a:rPr>
               <a:t>(2,8)</a:t>
             </a:r>
-            <a:endParaRPr lang="en-US" sz="1800" dirty="0">
+            <a:endParaRPr lang="en-US" sz="2000" dirty="0">
               <a:effectLst/>
               <a:latin typeface="Calibri" panose="020F0502020204030204" pitchFamily="34" charset="0"/>
               <a:ea typeface="Calibri" panose="020F0502020204030204" pitchFamily="34" charset="0"/>
-              <a:cs typeface="Arial" panose="020B0604020202020204" pitchFamily="34" charset="0"/>
+              <a:cs typeface="Calibri" panose="020F0502020204030204" pitchFamily="34" charset="0"/>
             </a:endParaRPr>
           </a:p>
           <a:p>
@@ -16475,37 +16794,19 @@
               </a:spcAft>
             </a:pPr>
             <a:r>
-              <a:rPr lang="fa-IR" sz="1800" dirty="0">
+              <a:rPr lang="fa-IR" sz="2000" dirty="0">
                 <a:effectLst/>
                 <a:latin typeface="Calibri" panose="020F0502020204030204" pitchFamily="34" charset="0"/>
                 <a:ea typeface="Calibri" panose="020F0502020204030204" pitchFamily="34" charset="0"/>
-                <a:cs typeface="IRANSans" panose="020B0506030804020204" pitchFamily="34" charset="-78"/>
-              </a:rPr>
-              <a:t>در این مثال، 8 مقدار جدید و 2 </a:t>
-            </a:r>
-            <a:r>
-              <a:rPr lang="fa-IR" sz="1800" dirty="0" err="1">
-                <a:effectLst/>
-                <a:latin typeface="Calibri" panose="020F0502020204030204" pitchFamily="34" charset="0"/>
-                <a:ea typeface="Calibri" panose="020F0502020204030204" pitchFamily="34" charset="0"/>
-                <a:cs typeface="IRANSans" panose="020B0506030804020204" pitchFamily="34" charset="-78"/>
-              </a:rPr>
-              <a:t>الویت</a:t>
-            </a:r>
-            <a:r>
-              <a:rPr lang="fa-IR" sz="1800" dirty="0">
-                <a:effectLst/>
-                <a:latin typeface="Calibri" panose="020F0502020204030204" pitchFamily="34" charset="0"/>
-                <a:ea typeface="Calibri" panose="020F0502020204030204" pitchFamily="34" charset="0"/>
-                <a:cs typeface="IRANSans" panose="020B0506030804020204" pitchFamily="34" charset="-78"/>
-              </a:rPr>
-              <a:t> آن در صف است.</a:t>
-            </a:r>
-            <a:endParaRPr lang="en-US" sz="1800" dirty="0">
+                <a:cs typeface="Calibri" panose="020F0502020204030204" pitchFamily="34" charset="0"/>
+              </a:rPr>
+              <a:t>در این مثال، 8 مقدار جدید و 2 اولویت آن در صف است.</a:t>
+            </a:r>
+            <a:endParaRPr lang="en-US" sz="2000" dirty="0">
               <a:effectLst/>
               <a:latin typeface="Calibri" panose="020F0502020204030204" pitchFamily="34" charset="0"/>
               <a:ea typeface="Calibri" panose="020F0502020204030204" pitchFamily="34" charset="0"/>
-              <a:cs typeface="Arial" panose="020B0604020202020204" pitchFamily="34" charset="0"/>
+              <a:cs typeface="Calibri" panose="020F0502020204030204" pitchFamily="34" charset="0"/>
             </a:endParaRPr>
           </a:p>
         </p:txBody>
@@ -16537,11 +16838,17 @@
           <a:lstStyle/>
           <a:p>
             <a:fld id="{8B48EBF6-60E6-462A-9155-5FAF136BCCBC}" type="slidenum">
-              <a:rPr lang="en-US" smtClean="0"/>
+              <a:rPr lang="en-US" smtClean="0">
+                <a:latin typeface="Calibri" panose="020F0502020204030204" pitchFamily="34" charset="0"/>
+                <a:cs typeface="Calibri" panose="020F0502020204030204" pitchFamily="34" charset="0"/>
+              </a:rPr>
               <a:pPr/>
               <a:t>9</a:t>
             </a:fld>
-            <a:endParaRPr lang="en-US" dirty="0"/>
+            <a:endParaRPr lang="en-US" dirty="0">
+              <a:latin typeface="Calibri" panose="020F0502020204030204" pitchFamily="34" charset="0"/>
+              <a:cs typeface="Calibri" panose="020F0502020204030204" pitchFamily="34" charset="0"/>
+            </a:endParaRPr>
           </a:p>
         </p:txBody>
       </p:sp>
@@ -16575,13 +16882,13 @@
           <a:p>
             <a:pPr algn="ctr" rtl="1"/>
             <a:r>
-              <a:rPr lang="fa-IR" sz="2800" b="0" i="0" dirty="0">
+              <a:rPr lang="fa-IR" sz="2800" b="1" i="0" dirty="0">
                 <a:solidFill>
                   <a:srgbClr val="EB5A64"/>
                 </a:solidFill>
                 <a:effectLst/>
-                <a:latin typeface="IRANSans" panose="020B0506030804020204" pitchFamily="34" charset="-78"/>
-                <a:cs typeface="IRANSans" panose="020B0506030804020204" pitchFamily="34" charset="-78"/>
+                <a:latin typeface="Calibri" panose="020F0502020204030204" pitchFamily="34" charset="0"/>
+                <a:cs typeface="Calibri" panose="020F0502020204030204" pitchFamily="34" charset="0"/>
               </a:rPr>
               <a:t>الگوریتم اضافه کردن صف الویت دار:</a:t>
             </a:r>
@@ -17098,22 +17405,12 @@
 </file>
 
 <file path=customXml/item1.xml><?xml version="1.0" encoding="utf-8"?>
-<p:properties xmlns:p="http://schemas.microsoft.com/office/2006/metadata/properties" xmlns:xsi="http://www.w3.org/2001/XMLSchema-instance" xmlns:pc="http://schemas.microsoft.com/office/infopath/2007/PartnerControls">
-  <documentManagement>
-    <_ip_UnifiedCompliancePolicyUIAction xmlns="http://schemas.microsoft.com/sharepoint/v3" xsi:nil="true"/>
-    <Image xmlns="71af3243-3dd4-4a8d-8c0d-dd76da1f02a5">
-      <Url xsi:nil="true"/>
-      <Description xsi:nil="true"/>
-    </Image>
-    <Status xmlns="71af3243-3dd4-4a8d-8c0d-dd76da1f02a5">Not started</Status>
-    <_ip_UnifiedCompliancePolicyProperties xmlns="http://schemas.microsoft.com/sharepoint/v3" xsi:nil="true"/>
-    <lcf76f155ced4ddcb4097134ff3c332f xmlns="71af3243-3dd4-4a8d-8c0d-dd76da1f02a5">
-      <Terms xmlns="http://schemas.microsoft.com/office/infopath/2007/PartnerControls"/>
-    </lcf76f155ced4ddcb4097134ff3c332f>
-    <TaxCatchAll xmlns="230e9df3-be65-4c73-a93b-d1236ebd677e"/>
-    <MediaServiceKeyPoints xmlns="71af3243-3dd4-4a8d-8c0d-dd76da1f02a5" xsi:nil="true"/>
-  </documentManagement>
-</p:properties>
+<?mso-contentType ?>
+<FormTemplates xmlns="http://schemas.microsoft.com/sharepoint/v3/contenttype/forms">
+  <Display>DocumentLibraryForm</Display>
+  <Edit>DocumentLibraryForm</Edit>
+  <New>DocumentLibraryForm</New>
+</FormTemplates>
 </file>
 
 <file path=customXml/item2.xml><?xml version="1.0" encoding="utf-8"?>
@@ -17393,22 +17690,28 @@
 </file>
 
 <file path=customXml/item3.xml><?xml version="1.0" encoding="utf-8"?>
-<?mso-contentType ?>
-<FormTemplates xmlns="http://schemas.microsoft.com/sharepoint/v3/contenttype/forms">
-  <Display>DocumentLibraryForm</Display>
-  <Edit>DocumentLibraryForm</Edit>
-  <New>DocumentLibraryForm</New>
-</FormTemplates>
+<p:properties xmlns:p="http://schemas.microsoft.com/office/2006/metadata/properties" xmlns:xsi="http://www.w3.org/2001/XMLSchema-instance" xmlns:pc="http://schemas.microsoft.com/office/infopath/2007/PartnerControls">
+  <documentManagement>
+    <_ip_UnifiedCompliancePolicyUIAction xmlns="http://schemas.microsoft.com/sharepoint/v3" xsi:nil="true"/>
+    <Image xmlns="71af3243-3dd4-4a8d-8c0d-dd76da1f02a5">
+      <Url xsi:nil="true"/>
+      <Description xsi:nil="true"/>
+    </Image>
+    <Status xmlns="71af3243-3dd4-4a8d-8c0d-dd76da1f02a5">Not started</Status>
+    <_ip_UnifiedCompliancePolicyProperties xmlns="http://schemas.microsoft.com/sharepoint/v3" xsi:nil="true"/>
+    <lcf76f155ced4ddcb4097134ff3c332f xmlns="71af3243-3dd4-4a8d-8c0d-dd76da1f02a5">
+      <Terms xmlns="http://schemas.microsoft.com/office/infopath/2007/PartnerControls"/>
+    </lcf76f155ced4ddcb4097134ff3c332f>
+    <TaxCatchAll xmlns="230e9df3-be65-4c73-a93b-d1236ebd677e"/>
+    <MediaServiceKeyPoints xmlns="71af3243-3dd4-4a8d-8c0d-dd76da1f02a5" xsi:nil="true"/>
+  </documentManagement>
+</p:properties>
 </file>
 
 <file path=customXml/itemProps1.xml><?xml version="1.0" encoding="utf-8"?>
-<ds:datastoreItem xmlns:ds="http://schemas.openxmlformats.org/officeDocument/2006/customXml" ds:itemID="{9B9123E8-1B6B-49B5-873D-A8D01C369B68}">
+<ds:datastoreItem xmlns:ds="http://schemas.openxmlformats.org/officeDocument/2006/customXml" ds:itemID="{8C51EB17-D597-42E7-995C-18B75FCBF237}">
   <ds:schemaRefs>
-    <ds:schemaRef ds:uri="http://schemas.microsoft.com/office/2006/metadata/properties"/>
-    <ds:schemaRef ds:uri="http://schemas.microsoft.com/office/infopath/2007/PartnerControls"/>
-    <ds:schemaRef ds:uri="http://schemas.microsoft.com/sharepoint/v3"/>
-    <ds:schemaRef ds:uri="71af3243-3dd4-4a8d-8c0d-dd76da1f02a5"/>
-    <ds:schemaRef ds:uri="230e9df3-be65-4c73-a93b-d1236ebd677e"/>
+    <ds:schemaRef ds:uri="http://schemas.microsoft.com/sharepoint/v3/contenttype/forms"/>
   </ds:schemaRefs>
 </ds:datastoreItem>
 </file>
@@ -17435,9 +17738,13 @@
 </file>
 
 <file path=customXml/itemProps3.xml><?xml version="1.0" encoding="utf-8"?>
-<ds:datastoreItem xmlns:ds="http://schemas.openxmlformats.org/officeDocument/2006/customXml" ds:itemID="{8C51EB17-D597-42E7-995C-18B75FCBF237}">
+<ds:datastoreItem xmlns:ds="http://schemas.openxmlformats.org/officeDocument/2006/customXml" ds:itemID="{9B9123E8-1B6B-49B5-873D-A8D01C369B68}">
   <ds:schemaRefs>
-    <ds:schemaRef ds:uri="http://schemas.microsoft.com/sharepoint/v3/contenttype/forms"/>
+    <ds:schemaRef ds:uri="http://schemas.microsoft.com/office/2006/metadata/properties"/>
+    <ds:schemaRef ds:uri="http://schemas.microsoft.com/office/infopath/2007/PartnerControls"/>
+    <ds:schemaRef ds:uri="http://schemas.microsoft.com/sharepoint/v3"/>
+    <ds:schemaRef ds:uri="71af3243-3dd4-4a8d-8c0d-dd76da1f02a5"/>
+    <ds:schemaRef ds:uri="230e9df3-be65-4c73-a93b-d1236ebd677e"/>
   </ds:schemaRefs>
 </ds:datastoreItem>
 </file>

</xml_diff>